<commit_message>
case of anisotropic dissipation moved from General to ImpedanceMethod
Signed-off-by: Kutlin A <kutawell95@mail.ru>
</commit_message>
<xml_diff>
--- a/images/images.pptx
+++ b/images/images.pptx
@@ -7,6 +7,7 @@
   <p:sldIdLst>
     <p:sldId id="256" r:id="rId2"/>
     <p:sldId id="257" r:id="rId3"/>
+    <p:sldId id="258" r:id="rId4"/>
   </p:sldIdLst>
   <p:sldSz cx="9144000" cy="6858000" type="screen4x3"/>
   <p:notesSz cx="6858000" cy="9144000"/>
@@ -290,7 +291,7 @@
             <a:fld id="{75887C6C-CE15-4571-82F3-1AB9859FC7F9}" type="datetimeFigureOut">
               <a:rPr lang="ru-RU" smtClean="0"/>
               <a:pPr/>
-              <a:t>06.06.2016</a:t>
+              <a:t>08.06.2016</a:t>
             </a:fld>
             <a:endParaRPr lang="ru-RU"/>
           </a:p>
@@ -462,7 +463,7 @@
             <a:fld id="{75887C6C-CE15-4571-82F3-1AB9859FC7F9}" type="datetimeFigureOut">
               <a:rPr lang="ru-RU" smtClean="0"/>
               <a:pPr/>
-              <a:t>06.06.2016</a:t>
+              <a:t>08.06.2016</a:t>
             </a:fld>
             <a:endParaRPr lang="ru-RU"/>
           </a:p>
@@ -644,7 +645,7 @@
             <a:fld id="{75887C6C-CE15-4571-82F3-1AB9859FC7F9}" type="datetimeFigureOut">
               <a:rPr lang="ru-RU" smtClean="0"/>
               <a:pPr/>
-              <a:t>06.06.2016</a:t>
+              <a:t>08.06.2016</a:t>
             </a:fld>
             <a:endParaRPr lang="ru-RU"/>
           </a:p>
@@ -816,7 +817,7 @@
             <a:fld id="{75887C6C-CE15-4571-82F3-1AB9859FC7F9}" type="datetimeFigureOut">
               <a:rPr lang="ru-RU" smtClean="0"/>
               <a:pPr/>
-              <a:t>06.06.2016</a:t>
+              <a:t>08.06.2016</a:t>
             </a:fld>
             <a:endParaRPr lang="ru-RU"/>
           </a:p>
@@ -1064,7 +1065,7 @@
             <a:fld id="{75887C6C-CE15-4571-82F3-1AB9859FC7F9}" type="datetimeFigureOut">
               <a:rPr lang="ru-RU" smtClean="0"/>
               <a:pPr/>
-              <a:t>06.06.2016</a:t>
+              <a:t>08.06.2016</a:t>
             </a:fld>
             <a:endParaRPr lang="ru-RU"/>
           </a:p>
@@ -1354,7 +1355,7 @@
             <a:fld id="{75887C6C-CE15-4571-82F3-1AB9859FC7F9}" type="datetimeFigureOut">
               <a:rPr lang="ru-RU" smtClean="0"/>
               <a:pPr/>
-              <a:t>06.06.2016</a:t>
+              <a:t>08.06.2016</a:t>
             </a:fld>
             <a:endParaRPr lang="ru-RU"/>
           </a:p>
@@ -1778,7 +1779,7 @@
             <a:fld id="{75887C6C-CE15-4571-82F3-1AB9859FC7F9}" type="datetimeFigureOut">
               <a:rPr lang="ru-RU" smtClean="0"/>
               <a:pPr/>
-              <a:t>06.06.2016</a:t>
+              <a:t>08.06.2016</a:t>
             </a:fld>
             <a:endParaRPr lang="ru-RU"/>
           </a:p>
@@ -1898,7 +1899,7 @@
             <a:fld id="{75887C6C-CE15-4571-82F3-1AB9859FC7F9}" type="datetimeFigureOut">
               <a:rPr lang="ru-RU" smtClean="0"/>
               <a:pPr/>
-              <a:t>06.06.2016</a:t>
+              <a:t>08.06.2016</a:t>
             </a:fld>
             <a:endParaRPr lang="ru-RU"/>
           </a:p>
@@ -1995,7 +1996,7 @@
             <a:fld id="{75887C6C-CE15-4571-82F3-1AB9859FC7F9}" type="datetimeFigureOut">
               <a:rPr lang="ru-RU" smtClean="0"/>
               <a:pPr/>
-              <a:t>06.06.2016</a:t>
+              <a:t>08.06.2016</a:t>
             </a:fld>
             <a:endParaRPr lang="ru-RU"/>
           </a:p>
@@ -2274,7 +2275,7 @@
             <a:fld id="{75887C6C-CE15-4571-82F3-1AB9859FC7F9}" type="datetimeFigureOut">
               <a:rPr lang="ru-RU" smtClean="0"/>
               <a:pPr/>
-              <a:t>06.06.2016</a:t>
+              <a:t>08.06.2016</a:t>
             </a:fld>
             <a:endParaRPr lang="ru-RU"/>
           </a:p>
@@ -2529,7 +2530,7 @@
             <a:fld id="{75887C6C-CE15-4571-82F3-1AB9859FC7F9}" type="datetimeFigureOut">
               <a:rPr lang="ru-RU" smtClean="0"/>
               <a:pPr/>
-              <a:t>06.06.2016</a:t>
+              <a:t>08.06.2016</a:t>
             </a:fld>
             <a:endParaRPr lang="ru-RU"/>
           </a:p>
@@ -2744,7 +2745,7 @@
             <a:fld id="{75887C6C-CE15-4571-82F3-1AB9859FC7F9}" type="datetimeFigureOut">
               <a:rPr lang="ru-RU" smtClean="0"/>
               <a:pPr/>
-              <a:t>06.06.2016</a:t>
+              <a:t>08.06.2016</a:t>
             </a:fld>
             <a:endParaRPr lang="ru-RU"/>
           </a:p>
@@ -6008,12 +6009,2498 @@
           </a:p>
         </p:txBody>
       </p:sp>
+      <p:sp>
+        <p:nvSpPr>
+          <p:cNvPr id="31" name="Oval 55"/>
+          <p:cNvSpPr>
+            <a:spLocks noChangeAspect="1"/>
+          </p:cNvSpPr>
+          <p:nvPr/>
+        </p:nvSpPr>
+        <p:spPr>
+          <a:xfrm>
+            <a:off x="3863306" y="3687810"/>
+            <a:ext cx="62898" cy="62906"/>
+          </a:xfrm>
+          <a:prstGeom prst="ellipse">
+            <a:avLst/>
+          </a:prstGeom>
+          <a:solidFill>
+            <a:schemeClr val="tx1"/>
+          </a:solidFill>
+          <a:ln>
+            <a:noFill/>
+          </a:ln>
+        </p:spPr>
+        <p:style>
+          <a:lnRef idx="2">
+            <a:schemeClr val="accent1">
+              <a:shade val="50000"/>
+            </a:schemeClr>
+          </a:lnRef>
+          <a:fillRef idx="1">
+            <a:schemeClr val="accent1"/>
+          </a:fillRef>
+          <a:effectRef idx="0">
+            <a:schemeClr val="accent1"/>
+          </a:effectRef>
+          <a:fontRef idx="minor">
+            <a:schemeClr val="lt1"/>
+          </a:fontRef>
+        </p:style>
+        <p:txBody>
+          <a:bodyPr rtlCol="0" anchor="ctr"/>
+          <a:lstStyle/>
+          <a:p>
+            <a:pPr algn="ctr"/>
+            <a:endParaRPr lang="ru-RU"/>
+          </a:p>
+        </p:txBody>
+      </p:sp>
     </p:spTree>
     <p:extLst>
       <p:ext uri="{BB962C8B-B14F-4D97-AF65-F5344CB8AC3E}">
         <p14:creationId xmlns:p14="http://schemas.microsoft.com/office/powerpoint/2010/main" xmlns="" val="732466476"/>
       </p:ext>
     </p:extLst>
+  </p:cSld>
+  <p:clrMapOvr>
+    <a:masterClrMapping/>
+  </p:clrMapOvr>
+</p:sld>
+</file>
+
+<file path=ppt/slides/slide3.xml><?xml version="1.0" encoding="utf-8"?>
+<p:sld xmlns:a="http://schemas.openxmlformats.org/drawingml/2006/main" xmlns:r="http://schemas.openxmlformats.org/officeDocument/2006/relationships" xmlns:p="http://schemas.openxmlformats.org/presentationml/2006/main">
+  <p:cSld>
+    <p:spTree>
+      <p:nvGrpSpPr>
+        <p:cNvPr id="1" name=""/>
+        <p:cNvGrpSpPr/>
+        <p:nvPr/>
+      </p:nvGrpSpPr>
+      <p:grpSpPr>
+        <a:xfrm>
+          <a:off x="0" y="0"/>
+          <a:ext cx="0" cy="0"/>
+          <a:chOff x="0" y="0"/>
+          <a:chExt cx="0" cy="0"/>
+        </a:xfrm>
+      </p:grpSpPr>
+      <p:cxnSp>
+        <p:nvCxnSpPr>
+          <p:cNvPr id="4" name="Straight Arrow Connector 37"/>
+          <p:cNvCxnSpPr/>
+          <p:nvPr/>
+        </p:nvCxnSpPr>
+        <p:spPr>
+          <a:xfrm>
+            <a:off x="3899652" y="3717032"/>
+            <a:ext cx="4176464" cy="0"/>
+          </a:xfrm>
+          <a:prstGeom prst="straightConnector1">
+            <a:avLst/>
+          </a:prstGeom>
+          <a:ln w="12700">
+            <a:solidFill>
+              <a:schemeClr val="tx1"/>
+            </a:solidFill>
+            <a:tailEnd type="stealth" w="lg" len="lg"/>
+          </a:ln>
+        </p:spPr>
+        <p:style>
+          <a:lnRef idx="1">
+            <a:schemeClr val="accent1"/>
+          </a:lnRef>
+          <a:fillRef idx="0">
+            <a:schemeClr val="accent1"/>
+          </a:fillRef>
+          <a:effectRef idx="0">
+            <a:schemeClr val="accent1"/>
+          </a:effectRef>
+          <a:fontRef idx="minor">
+            <a:schemeClr val="tx1"/>
+          </a:fontRef>
+        </p:style>
+      </p:cxnSp>
+      <p:cxnSp>
+        <p:nvCxnSpPr>
+          <p:cNvPr id="5" name="Straight Arrow Connector 38"/>
+          <p:cNvCxnSpPr/>
+          <p:nvPr/>
+        </p:nvCxnSpPr>
+        <p:spPr>
+          <a:xfrm flipH="1">
+            <a:off x="1163348" y="2708920"/>
+            <a:ext cx="4272748" cy="2808312"/>
+          </a:xfrm>
+          <a:prstGeom prst="straightConnector1">
+            <a:avLst/>
+          </a:prstGeom>
+          <a:ln w="12700">
+            <a:solidFill>
+              <a:schemeClr val="tx1"/>
+            </a:solidFill>
+            <a:tailEnd type="stealth" w="lg" len="lg"/>
+          </a:ln>
+        </p:spPr>
+        <p:style>
+          <a:lnRef idx="1">
+            <a:schemeClr val="accent1"/>
+          </a:lnRef>
+          <a:fillRef idx="0">
+            <a:schemeClr val="accent1"/>
+          </a:fillRef>
+          <a:effectRef idx="0">
+            <a:schemeClr val="accent1"/>
+          </a:effectRef>
+          <a:fontRef idx="minor">
+            <a:schemeClr val="tx1"/>
+          </a:fontRef>
+        </p:style>
+      </p:cxnSp>
+      <p:cxnSp>
+        <p:nvCxnSpPr>
+          <p:cNvPr id="6" name="Straight Arrow Connector 41"/>
+          <p:cNvCxnSpPr/>
+          <p:nvPr/>
+        </p:nvCxnSpPr>
+        <p:spPr>
+          <a:xfrm flipV="1">
+            <a:off x="3899652" y="1052736"/>
+            <a:ext cx="0" cy="2664296"/>
+          </a:xfrm>
+          <a:prstGeom prst="straightConnector1">
+            <a:avLst/>
+          </a:prstGeom>
+          <a:ln w="12700">
+            <a:solidFill>
+              <a:schemeClr val="tx1"/>
+            </a:solidFill>
+            <a:tailEnd type="stealth" w="lg" len="lg"/>
+          </a:ln>
+        </p:spPr>
+        <p:style>
+          <a:lnRef idx="1">
+            <a:schemeClr val="accent1"/>
+          </a:lnRef>
+          <a:fillRef idx="0">
+            <a:schemeClr val="accent1"/>
+          </a:fillRef>
+          <a:effectRef idx="0">
+            <a:schemeClr val="accent1"/>
+          </a:effectRef>
+          <a:fontRef idx="minor">
+            <a:schemeClr val="tx1"/>
+          </a:fontRef>
+        </p:style>
+      </p:cxnSp>
+      <p:cxnSp>
+        <p:nvCxnSpPr>
+          <p:cNvPr id="7" name="Straight Arrow Connector 46"/>
+          <p:cNvCxnSpPr/>
+          <p:nvPr/>
+        </p:nvCxnSpPr>
+        <p:spPr>
+          <a:xfrm flipV="1">
+            <a:off x="3892289" y="2132856"/>
+            <a:ext cx="1759831" cy="1585008"/>
+          </a:xfrm>
+          <a:prstGeom prst="straightConnector1">
+            <a:avLst/>
+          </a:prstGeom>
+          <a:ln w="25400">
+            <a:solidFill>
+              <a:schemeClr val="tx1"/>
+            </a:solidFill>
+            <a:tailEnd type="stealth" w="med" len="lg"/>
+          </a:ln>
+        </p:spPr>
+        <p:style>
+          <a:lnRef idx="1">
+            <a:schemeClr val="accent1"/>
+          </a:lnRef>
+          <a:fillRef idx="0">
+            <a:schemeClr val="accent1"/>
+          </a:fillRef>
+          <a:effectRef idx="0">
+            <a:schemeClr val="accent1"/>
+          </a:effectRef>
+          <a:fontRef idx="minor">
+            <a:schemeClr val="tx1"/>
+          </a:fontRef>
+        </p:style>
+      </p:cxnSp>
+      <p:cxnSp>
+        <p:nvCxnSpPr>
+          <p:cNvPr id="8" name="Straight Connector 51"/>
+          <p:cNvCxnSpPr/>
+          <p:nvPr/>
+        </p:nvCxnSpPr>
+        <p:spPr>
+          <a:xfrm>
+            <a:off x="5634868" y="2177786"/>
+            <a:ext cx="0" cy="2772000"/>
+          </a:xfrm>
+          <a:prstGeom prst="line">
+            <a:avLst/>
+          </a:prstGeom>
+          <a:ln>
+            <a:solidFill>
+              <a:schemeClr val="tx1"/>
+            </a:solidFill>
+            <a:prstDash val="lgDash"/>
+          </a:ln>
+        </p:spPr>
+        <p:style>
+          <a:lnRef idx="1">
+            <a:schemeClr val="accent1"/>
+          </a:lnRef>
+          <a:fillRef idx="0">
+            <a:schemeClr val="accent1"/>
+          </a:fillRef>
+          <a:effectRef idx="0">
+            <a:schemeClr val="accent1"/>
+          </a:effectRef>
+          <a:fontRef idx="minor">
+            <a:schemeClr val="tx1"/>
+          </a:fontRef>
+        </p:style>
+      </p:cxnSp>
+      <p:cxnSp>
+        <p:nvCxnSpPr>
+          <p:cNvPr id="9" name="Straight Connector 52"/>
+          <p:cNvCxnSpPr/>
+          <p:nvPr/>
+        </p:nvCxnSpPr>
+        <p:spPr>
+          <a:xfrm flipH="1">
+            <a:off x="5611281" y="3717864"/>
+            <a:ext cx="2047331" cy="1237848"/>
+          </a:xfrm>
+          <a:prstGeom prst="line">
+            <a:avLst/>
+          </a:prstGeom>
+          <a:ln>
+            <a:solidFill>
+              <a:schemeClr val="tx1"/>
+            </a:solidFill>
+            <a:prstDash val="lgDash"/>
+          </a:ln>
+        </p:spPr>
+        <p:style>
+          <a:lnRef idx="1">
+            <a:schemeClr val="accent1"/>
+          </a:lnRef>
+          <a:fillRef idx="0">
+            <a:schemeClr val="accent1"/>
+          </a:fillRef>
+          <a:effectRef idx="0">
+            <a:schemeClr val="accent1"/>
+          </a:effectRef>
+          <a:fontRef idx="minor">
+            <a:schemeClr val="tx1"/>
+          </a:fontRef>
+        </p:style>
+      </p:cxnSp>
+      <p:cxnSp>
+        <p:nvCxnSpPr>
+          <p:cNvPr id="10" name="Straight Connector 56"/>
+          <p:cNvCxnSpPr/>
+          <p:nvPr/>
+        </p:nvCxnSpPr>
+        <p:spPr>
+          <a:xfrm flipH="1" flipV="1">
+            <a:off x="2027444" y="4945776"/>
+            <a:ext cx="3582946" cy="5566"/>
+          </a:xfrm>
+          <a:prstGeom prst="line">
+            <a:avLst/>
+          </a:prstGeom>
+          <a:ln>
+            <a:solidFill>
+              <a:schemeClr val="tx1"/>
+            </a:solidFill>
+            <a:prstDash val="lgDash"/>
+          </a:ln>
+        </p:spPr>
+        <p:style>
+          <a:lnRef idx="1">
+            <a:schemeClr val="accent1"/>
+          </a:lnRef>
+          <a:fillRef idx="0">
+            <a:schemeClr val="accent1"/>
+          </a:fillRef>
+          <a:effectRef idx="0">
+            <a:schemeClr val="accent1"/>
+          </a:effectRef>
+          <a:fontRef idx="minor">
+            <a:schemeClr val="tx1"/>
+          </a:fontRef>
+        </p:style>
+      </p:cxnSp>
+      <p:cxnSp>
+        <p:nvCxnSpPr>
+          <p:cNvPr id="11" name="Straight Connector 62"/>
+          <p:cNvCxnSpPr/>
+          <p:nvPr/>
+        </p:nvCxnSpPr>
+        <p:spPr>
+          <a:xfrm>
+            <a:off x="3892289" y="3717864"/>
+            <a:ext cx="1718992" cy="1227912"/>
+          </a:xfrm>
+          <a:prstGeom prst="line">
+            <a:avLst/>
+          </a:prstGeom>
+          <a:ln>
+            <a:solidFill>
+              <a:schemeClr val="tx1"/>
+            </a:solidFill>
+            <a:prstDash val="lgDash"/>
+          </a:ln>
+        </p:spPr>
+        <p:style>
+          <a:lnRef idx="1">
+            <a:schemeClr val="accent1"/>
+          </a:lnRef>
+          <a:fillRef idx="0">
+            <a:schemeClr val="accent1"/>
+          </a:fillRef>
+          <a:effectRef idx="0">
+            <a:schemeClr val="accent1"/>
+          </a:effectRef>
+          <a:fontRef idx="minor">
+            <a:schemeClr val="tx1"/>
+          </a:fontRef>
+        </p:style>
+      </p:cxnSp>
+      <p:sp>
+        <p:nvSpPr>
+          <p:cNvPr id="12" name="Freeform 68"/>
+          <p:cNvSpPr/>
+          <p:nvPr/>
+        </p:nvSpPr>
+        <p:spPr>
+          <a:xfrm>
+            <a:off x="4131326" y="3509633"/>
+            <a:ext cx="75202" cy="399353"/>
+          </a:xfrm>
+          <a:custGeom>
+            <a:avLst/>
+            <a:gdLst>
+              <a:gd name="connsiteX0" fmla="*/ 0 w 139118"/>
+              <a:gd name="connsiteY0" fmla="*/ 0 h 428878"/>
+              <a:gd name="connsiteX1" fmla="*/ 89013 w 139118"/>
+              <a:gd name="connsiteY1" fmla="*/ 89013 h 428878"/>
+              <a:gd name="connsiteX2" fmla="*/ 137565 w 139118"/>
+              <a:gd name="connsiteY2" fmla="*/ 210393 h 428878"/>
+              <a:gd name="connsiteX3" fmla="*/ 121381 w 139118"/>
+              <a:gd name="connsiteY3" fmla="*/ 339866 h 428878"/>
+              <a:gd name="connsiteX4" fmla="*/ 64736 w 139118"/>
+              <a:gd name="connsiteY4" fmla="*/ 428878 h 428878"/>
+            </a:gdLst>
+            <a:ahLst/>
+            <a:cxnLst>
+              <a:cxn ang="0">
+                <a:pos x="connsiteX0" y="connsiteY0"/>
+              </a:cxn>
+              <a:cxn ang="0">
+                <a:pos x="connsiteX1" y="connsiteY1"/>
+              </a:cxn>
+              <a:cxn ang="0">
+                <a:pos x="connsiteX2" y="connsiteY2"/>
+              </a:cxn>
+              <a:cxn ang="0">
+                <a:pos x="connsiteX3" y="connsiteY3"/>
+              </a:cxn>
+              <a:cxn ang="0">
+                <a:pos x="connsiteX4" y="connsiteY4"/>
+              </a:cxn>
+            </a:cxnLst>
+            <a:rect l="l" t="t" r="r" b="b"/>
+            <a:pathLst>
+              <a:path w="139118" h="428878">
+                <a:moveTo>
+                  <a:pt x="0" y="0"/>
+                </a:moveTo>
+                <a:cubicBezTo>
+                  <a:pt x="33043" y="26974"/>
+                  <a:pt x="66086" y="53948"/>
+                  <a:pt x="89013" y="89013"/>
+                </a:cubicBezTo>
+                <a:cubicBezTo>
+                  <a:pt x="111940" y="124078"/>
+                  <a:pt x="132170" y="168584"/>
+                  <a:pt x="137565" y="210393"/>
+                </a:cubicBezTo>
+                <a:cubicBezTo>
+                  <a:pt x="142960" y="252202"/>
+                  <a:pt x="133519" y="303452"/>
+                  <a:pt x="121381" y="339866"/>
+                </a:cubicBezTo>
+                <a:cubicBezTo>
+                  <a:pt x="109243" y="376280"/>
+                  <a:pt x="86989" y="402579"/>
+                  <a:pt x="64736" y="428878"/>
+                </a:cubicBezTo>
+              </a:path>
+            </a:pathLst>
+          </a:custGeom>
+          <a:noFill/>
+          <a:ln w="12700">
+            <a:solidFill>
+              <a:schemeClr val="tx1"/>
+            </a:solidFill>
+          </a:ln>
+        </p:spPr>
+        <p:style>
+          <a:lnRef idx="2">
+            <a:schemeClr val="accent1">
+              <a:shade val="50000"/>
+            </a:schemeClr>
+          </a:lnRef>
+          <a:fillRef idx="1">
+            <a:schemeClr val="accent1"/>
+          </a:fillRef>
+          <a:effectRef idx="0">
+            <a:schemeClr val="accent1"/>
+          </a:effectRef>
+          <a:fontRef idx="minor">
+            <a:schemeClr val="lt1"/>
+          </a:fontRef>
+        </p:style>
+        <p:txBody>
+          <a:bodyPr rtlCol="0" anchor="ctr"/>
+          <a:lstStyle/>
+          <a:p>
+            <a:pPr algn="ctr"/>
+            <a:endParaRPr lang="ru-RU"/>
+          </a:p>
+        </p:txBody>
+      </p:sp>
+      <p:sp>
+        <p:nvSpPr>
+          <p:cNvPr id="13" name="TextBox 12"/>
+          <p:cNvSpPr txBox="1">
+            <a:spLocks noRot="1" noChangeAspect="1" noMove="1" noResize="1" noEditPoints="1" noAdjustHandles="1" noChangeArrowheads="1" noChangeShapeType="1" noTextEdit="1"/>
+          </p:cNvSpPr>
+          <p:nvPr/>
+        </p:nvSpPr>
+        <p:spPr>
+          <a:xfrm>
+            <a:off x="7715945" y="3651179"/>
+            <a:ext cx="616451" cy="402931"/>
+          </a:xfrm>
+          <a:prstGeom prst="rect">
+            <a:avLst/>
+          </a:prstGeom>
+          <a:blipFill rotWithShape="1">
+            <a:blip r:embed="rId2" cstate="print"/>
+            <a:stretch>
+              <a:fillRect b="-6061"/>
+            </a:stretch>
+          </a:blipFill>
+        </p:spPr>
+        <p:txBody>
+          <a:bodyPr/>
+          <a:lstStyle/>
+          <a:p>
+            <a:r>
+              <a:rPr lang="ru-RU">
+                <a:noFill/>
+              </a:rPr>
+              <a:t> </a:t>
+            </a:r>
+          </a:p>
+        </p:txBody>
+      </p:sp>
+      <p:sp>
+        <p:nvSpPr>
+          <p:cNvPr id="14" name="TextBox 13"/>
+          <p:cNvSpPr txBox="1">
+            <a:spLocks noRot="1" noChangeAspect="1" noMove="1" noResize="1" noEditPoints="1" noAdjustHandles="1" noChangeArrowheads="1" noChangeShapeType="1" noTextEdit="1"/>
+          </p:cNvSpPr>
+          <p:nvPr/>
+        </p:nvSpPr>
+        <p:spPr>
+          <a:xfrm>
+            <a:off x="1043608" y="5402333"/>
+            <a:ext cx="711220" cy="402931"/>
+          </a:xfrm>
+          <a:prstGeom prst="rect">
+            <a:avLst/>
+          </a:prstGeom>
+          <a:blipFill rotWithShape="1">
+            <a:blip r:embed="rId3" cstate="print"/>
+            <a:stretch>
+              <a:fillRect/>
+            </a:stretch>
+          </a:blipFill>
+        </p:spPr>
+        <p:txBody>
+          <a:bodyPr/>
+          <a:lstStyle/>
+          <a:p>
+            <a:r>
+              <a:rPr lang="ru-RU">
+                <a:noFill/>
+              </a:rPr>
+              <a:t> </a:t>
+            </a:r>
+          </a:p>
+        </p:txBody>
+      </p:sp>
+      <p:sp>
+        <p:nvSpPr>
+          <p:cNvPr id="15" name="TextBox 14"/>
+          <p:cNvSpPr txBox="1">
+            <a:spLocks noRot="1" noChangeAspect="1" noMove="1" noResize="1" noEditPoints="1" noAdjustHandles="1" noChangeArrowheads="1" noChangeShapeType="1" noTextEdit="1"/>
+          </p:cNvSpPr>
+          <p:nvPr/>
+        </p:nvSpPr>
+        <p:spPr>
+          <a:xfrm>
+            <a:off x="3905942" y="908720"/>
+            <a:ext cx="353750" cy="369332"/>
+          </a:xfrm>
+          <a:prstGeom prst="rect">
+            <a:avLst/>
+          </a:prstGeom>
+          <a:blipFill rotWithShape="1">
+            <a:blip r:embed="rId4" cstate="print"/>
+            <a:stretch>
+              <a:fillRect/>
+            </a:stretch>
+          </a:blipFill>
+        </p:spPr>
+        <p:txBody>
+          <a:bodyPr/>
+          <a:lstStyle/>
+          <a:p>
+            <a:r>
+              <a:rPr lang="ru-RU">
+                <a:noFill/>
+              </a:rPr>
+              <a:t> </a:t>
+            </a:r>
+          </a:p>
+        </p:txBody>
+      </p:sp>
+      <p:sp>
+        <p:nvSpPr>
+          <p:cNvPr id="17" name="Полилиния 16"/>
+          <p:cNvSpPr/>
+          <p:nvPr/>
+        </p:nvSpPr>
+        <p:spPr>
+          <a:xfrm>
+            <a:off x="3521868" y="3964781"/>
+            <a:ext cx="714375" cy="105172"/>
+          </a:xfrm>
+          <a:custGeom>
+            <a:avLst/>
+            <a:gdLst>
+              <a:gd name="connsiteX0" fmla="*/ 0 w 714375"/>
+              <a:gd name="connsiteY0" fmla="*/ 7144 h 105172"/>
+              <a:gd name="connsiteX1" fmla="*/ 152400 w 714375"/>
+              <a:gd name="connsiteY1" fmla="*/ 76200 h 105172"/>
+              <a:gd name="connsiteX2" fmla="*/ 376238 w 714375"/>
+              <a:gd name="connsiteY2" fmla="*/ 104775 h 105172"/>
+              <a:gd name="connsiteX3" fmla="*/ 564357 w 714375"/>
+              <a:gd name="connsiteY3" fmla="*/ 78581 h 105172"/>
+              <a:gd name="connsiteX4" fmla="*/ 714375 w 714375"/>
+              <a:gd name="connsiteY4" fmla="*/ 0 h 105172"/>
+            </a:gdLst>
+            <a:ahLst/>
+            <a:cxnLst>
+              <a:cxn ang="0">
+                <a:pos x="connsiteX0" y="connsiteY0"/>
+              </a:cxn>
+              <a:cxn ang="0">
+                <a:pos x="connsiteX1" y="connsiteY1"/>
+              </a:cxn>
+              <a:cxn ang="0">
+                <a:pos x="connsiteX2" y="connsiteY2"/>
+              </a:cxn>
+              <a:cxn ang="0">
+                <a:pos x="connsiteX3" y="connsiteY3"/>
+              </a:cxn>
+              <a:cxn ang="0">
+                <a:pos x="connsiteX4" y="connsiteY4"/>
+              </a:cxn>
+            </a:cxnLst>
+            <a:rect l="l" t="t" r="r" b="b"/>
+            <a:pathLst>
+              <a:path w="714375" h="105172">
+                <a:moveTo>
+                  <a:pt x="0" y="7144"/>
+                </a:moveTo>
+                <a:cubicBezTo>
+                  <a:pt x="44847" y="33536"/>
+                  <a:pt x="89694" y="59928"/>
+                  <a:pt x="152400" y="76200"/>
+                </a:cubicBezTo>
+                <a:cubicBezTo>
+                  <a:pt x="215106" y="92472"/>
+                  <a:pt x="307579" y="104378"/>
+                  <a:pt x="376238" y="104775"/>
+                </a:cubicBezTo>
+                <a:cubicBezTo>
+                  <a:pt x="444897" y="105172"/>
+                  <a:pt x="508001" y="96043"/>
+                  <a:pt x="564357" y="78581"/>
+                </a:cubicBezTo>
+                <a:cubicBezTo>
+                  <a:pt x="620713" y="61119"/>
+                  <a:pt x="667544" y="30559"/>
+                  <a:pt x="714375" y="0"/>
+                </a:cubicBezTo>
+              </a:path>
+            </a:pathLst>
+          </a:custGeom>
+          <a:ln>
+            <a:solidFill>
+              <a:schemeClr val="tx1"/>
+            </a:solidFill>
+          </a:ln>
+        </p:spPr>
+        <p:style>
+          <a:lnRef idx="1">
+            <a:schemeClr val="accent1"/>
+          </a:lnRef>
+          <a:fillRef idx="0">
+            <a:schemeClr val="accent1"/>
+          </a:fillRef>
+          <a:effectRef idx="0">
+            <a:schemeClr val="accent1"/>
+          </a:effectRef>
+          <a:fontRef idx="minor">
+            <a:schemeClr val="tx1"/>
+          </a:fontRef>
+        </p:style>
+        <p:txBody>
+          <a:bodyPr rtlCol="0" anchor="ctr"/>
+          <a:lstStyle/>
+          <a:p>
+            <a:pPr algn="ctr"/>
+            <a:endParaRPr lang="ru-RU"/>
+          </a:p>
+        </p:txBody>
+      </p:sp>
+      <p:sp>
+        <p:nvSpPr>
+          <p:cNvPr id="18" name="Полилиния 17"/>
+          <p:cNvSpPr>
+            <a:spLocks noChangeAspect="1"/>
+          </p:cNvSpPr>
+          <p:nvPr/>
+        </p:nvSpPr>
+        <p:spPr>
+          <a:xfrm>
+            <a:off x="3453136" y="4001874"/>
+            <a:ext cx="843315" cy="124156"/>
+          </a:xfrm>
+          <a:custGeom>
+            <a:avLst/>
+            <a:gdLst>
+              <a:gd name="connsiteX0" fmla="*/ 0 w 714375"/>
+              <a:gd name="connsiteY0" fmla="*/ 7144 h 105172"/>
+              <a:gd name="connsiteX1" fmla="*/ 152400 w 714375"/>
+              <a:gd name="connsiteY1" fmla="*/ 76200 h 105172"/>
+              <a:gd name="connsiteX2" fmla="*/ 376238 w 714375"/>
+              <a:gd name="connsiteY2" fmla="*/ 104775 h 105172"/>
+              <a:gd name="connsiteX3" fmla="*/ 564357 w 714375"/>
+              <a:gd name="connsiteY3" fmla="*/ 78581 h 105172"/>
+              <a:gd name="connsiteX4" fmla="*/ 714375 w 714375"/>
+              <a:gd name="connsiteY4" fmla="*/ 0 h 105172"/>
+            </a:gdLst>
+            <a:ahLst/>
+            <a:cxnLst>
+              <a:cxn ang="0">
+                <a:pos x="connsiteX0" y="connsiteY0"/>
+              </a:cxn>
+              <a:cxn ang="0">
+                <a:pos x="connsiteX1" y="connsiteY1"/>
+              </a:cxn>
+              <a:cxn ang="0">
+                <a:pos x="connsiteX2" y="connsiteY2"/>
+              </a:cxn>
+              <a:cxn ang="0">
+                <a:pos x="connsiteX3" y="connsiteY3"/>
+              </a:cxn>
+              <a:cxn ang="0">
+                <a:pos x="connsiteX4" y="connsiteY4"/>
+              </a:cxn>
+            </a:cxnLst>
+            <a:rect l="l" t="t" r="r" b="b"/>
+            <a:pathLst>
+              <a:path w="714375" h="105172">
+                <a:moveTo>
+                  <a:pt x="0" y="7144"/>
+                </a:moveTo>
+                <a:cubicBezTo>
+                  <a:pt x="44847" y="33536"/>
+                  <a:pt x="89694" y="59928"/>
+                  <a:pt x="152400" y="76200"/>
+                </a:cubicBezTo>
+                <a:cubicBezTo>
+                  <a:pt x="215106" y="92472"/>
+                  <a:pt x="307579" y="104378"/>
+                  <a:pt x="376238" y="104775"/>
+                </a:cubicBezTo>
+                <a:cubicBezTo>
+                  <a:pt x="444897" y="105172"/>
+                  <a:pt x="508001" y="96043"/>
+                  <a:pt x="564357" y="78581"/>
+                </a:cubicBezTo>
+                <a:cubicBezTo>
+                  <a:pt x="620713" y="61119"/>
+                  <a:pt x="667544" y="30559"/>
+                  <a:pt x="714375" y="0"/>
+                </a:cubicBezTo>
+              </a:path>
+            </a:pathLst>
+          </a:custGeom>
+          <a:ln>
+            <a:solidFill>
+              <a:schemeClr val="tx1"/>
+            </a:solidFill>
+          </a:ln>
+        </p:spPr>
+        <p:style>
+          <a:lnRef idx="1">
+            <a:schemeClr val="accent1"/>
+          </a:lnRef>
+          <a:fillRef idx="0">
+            <a:schemeClr val="accent1"/>
+          </a:fillRef>
+          <a:effectRef idx="0">
+            <a:schemeClr val="accent1"/>
+          </a:effectRef>
+          <a:fontRef idx="minor">
+            <a:schemeClr val="tx1"/>
+          </a:fontRef>
+        </p:style>
+        <p:txBody>
+          <a:bodyPr rtlCol="0" anchor="ctr"/>
+          <a:lstStyle/>
+          <a:p>
+            <a:pPr algn="ctr"/>
+            <a:endParaRPr lang="ru-RU"/>
+          </a:p>
+        </p:txBody>
+      </p:sp>
+      <p:sp>
+        <p:nvSpPr>
+          <p:cNvPr id="19" name="TextBox 18"/>
+          <p:cNvSpPr txBox="1"/>
+          <p:nvPr/>
+        </p:nvSpPr>
+        <p:spPr>
+          <a:xfrm>
+            <a:off x="3707904" y="4077072"/>
+            <a:ext cx="308098" cy="369332"/>
+          </a:xfrm>
+          <a:prstGeom prst="rect">
+            <a:avLst/>
+          </a:prstGeom>
+          <a:noFill/>
+        </p:spPr>
+        <p:txBody>
+          <a:bodyPr wrap="none" rtlCol="0">
+            <a:spAutoFit/>
+          </a:bodyPr>
+          <a:lstStyle/>
+          <a:p>
+            <a:r>
+              <a:rPr lang="el-GR" dirty="0" smtClean="0">
+                <a:latin typeface="Cambria Math"/>
+                <a:ea typeface="Cambria Math"/>
+              </a:rPr>
+              <a:t>η</a:t>
+            </a:r>
+            <a:endParaRPr lang="ru-RU" dirty="0"/>
+          </a:p>
+        </p:txBody>
+      </p:sp>
+      <p:sp>
+        <p:nvSpPr>
+          <p:cNvPr id="20" name="TextBox 19"/>
+          <p:cNvSpPr txBox="1"/>
+          <p:nvPr/>
+        </p:nvSpPr>
+        <p:spPr>
+          <a:xfrm>
+            <a:off x="4139952" y="3645024"/>
+            <a:ext cx="311304" cy="369332"/>
+          </a:xfrm>
+          <a:prstGeom prst="rect">
+            <a:avLst/>
+          </a:prstGeom>
+          <a:noFill/>
+        </p:spPr>
+        <p:txBody>
+          <a:bodyPr wrap="none" rtlCol="0">
+            <a:spAutoFit/>
+          </a:bodyPr>
+          <a:lstStyle/>
+          <a:p>
+            <a:r>
+              <a:rPr lang="el-GR" dirty="0" smtClean="0">
+                <a:latin typeface="Cambria Math"/>
+                <a:ea typeface="Cambria Math"/>
+              </a:rPr>
+              <a:t>θ</a:t>
+            </a:r>
+            <a:endParaRPr lang="ru-RU" dirty="0"/>
+          </a:p>
+        </p:txBody>
+      </p:sp>
+      <p:cxnSp>
+        <p:nvCxnSpPr>
+          <p:cNvPr id="21" name="Straight Connector 56"/>
+          <p:cNvCxnSpPr/>
+          <p:nvPr/>
+        </p:nvCxnSpPr>
+        <p:spPr>
+          <a:xfrm flipH="1" flipV="1">
+            <a:off x="2043510" y="2127122"/>
+            <a:ext cx="3582946" cy="5566"/>
+          </a:xfrm>
+          <a:prstGeom prst="line">
+            <a:avLst/>
+          </a:prstGeom>
+          <a:ln>
+            <a:solidFill>
+              <a:schemeClr val="tx1"/>
+            </a:solidFill>
+            <a:prstDash val="lgDash"/>
+          </a:ln>
+        </p:spPr>
+        <p:style>
+          <a:lnRef idx="1">
+            <a:schemeClr val="accent1"/>
+          </a:lnRef>
+          <a:fillRef idx="0">
+            <a:schemeClr val="accent1"/>
+          </a:fillRef>
+          <a:effectRef idx="0">
+            <a:schemeClr val="accent1"/>
+          </a:effectRef>
+          <a:fontRef idx="minor">
+            <a:schemeClr val="tx1"/>
+          </a:fontRef>
+        </p:style>
+      </p:cxnSp>
+      <p:sp>
+        <p:nvSpPr>
+          <p:cNvPr id="1026" name="Rectangle 2"/>
+          <p:cNvSpPr>
+            <a:spLocks noChangeArrowheads="1"/>
+          </p:cNvSpPr>
+          <p:nvPr/>
+        </p:nvSpPr>
+        <p:spPr bwMode="auto">
+          <a:xfrm>
+            <a:off x="0" y="0"/>
+            <a:ext cx="9144000" cy="0"/>
+          </a:xfrm>
+          <a:prstGeom prst="rect">
+            <a:avLst/>
+          </a:prstGeom>
+          <a:noFill/>
+          <a:ln w="9525">
+            <a:noFill/>
+            <a:miter lim="800000"/>
+            <a:headEnd/>
+            <a:tailEnd/>
+          </a:ln>
+          <a:effectLst/>
+        </p:spPr>
+        <p:txBody>
+          <a:bodyPr vert="horz" wrap="none" lIns="91440" tIns="45720" rIns="91440" bIns="45720" numCol="1" anchor="ctr" anchorCtr="0" compatLnSpc="1">
+            <a:prstTxWarp prst="textNoShape">
+              <a:avLst/>
+            </a:prstTxWarp>
+            <a:spAutoFit/>
+          </a:bodyPr>
+          <a:lstStyle/>
+          <a:p>
+            <a:endParaRPr lang="ru-RU"/>
+          </a:p>
+        </p:txBody>
+      </p:sp>
+      <p:pic>
+        <p:nvPicPr>
+          <p:cNvPr id="1025" name="Picture 1"/>
+          <p:cNvPicPr>
+            <a:picLocks noChangeAspect="1" noChangeArrowheads="1"/>
+          </p:cNvPicPr>
+          <p:nvPr/>
+        </p:nvPicPr>
+        <p:blipFill>
+          <a:blip r:embed="rId5" cstate="print">
+            <a:clrChange>
+              <a:clrFrom>
+                <a:srgbClr val="FFFFFF"/>
+              </a:clrFrom>
+              <a:clrTo>
+                <a:srgbClr val="FFFFFF">
+                  <a:alpha val="0"/>
+                </a:srgbClr>
+              </a:clrTo>
+            </a:clrChange>
+          </a:blip>
+          <a:srcRect/>
+          <a:stretch>
+            <a:fillRect/>
+          </a:stretch>
+        </p:blipFill>
+        <p:spPr bwMode="auto">
+          <a:xfrm>
+            <a:off x="0" y="0"/>
+            <a:ext cx="85725" cy="219075"/>
+          </a:xfrm>
+          <a:prstGeom prst="rect">
+            <a:avLst/>
+          </a:prstGeom>
+          <a:noFill/>
+        </p:spPr>
+      </p:pic>
+      <p:sp>
+        <p:nvSpPr>
+          <p:cNvPr id="1028" name="Rectangle 4"/>
+          <p:cNvSpPr>
+            <a:spLocks noChangeArrowheads="1"/>
+          </p:cNvSpPr>
+          <p:nvPr/>
+        </p:nvSpPr>
+        <p:spPr bwMode="auto">
+          <a:xfrm>
+            <a:off x="0" y="0"/>
+            <a:ext cx="9144000" cy="0"/>
+          </a:xfrm>
+          <a:prstGeom prst="rect">
+            <a:avLst/>
+          </a:prstGeom>
+          <a:noFill/>
+          <a:ln w="9525">
+            <a:noFill/>
+            <a:miter lim="800000"/>
+            <a:headEnd/>
+            <a:tailEnd/>
+          </a:ln>
+          <a:effectLst/>
+        </p:spPr>
+        <p:txBody>
+          <a:bodyPr vert="horz" wrap="none" lIns="91440" tIns="45720" rIns="91440" bIns="45720" numCol="1" anchor="ctr" anchorCtr="0" compatLnSpc="1">
+            <a:prstTxWarp prst="textNoShape">
+              <a:avLst/>
+            </a:prstTxWarp>
+            <a:spAutoFit/>
+          </a:bodyPr>
+          <a:lstStyle/>
+          <a:p>
+            <a:endParaRPr lang="ru-RU"/>
+          </a:p>
+        </p:txBody>
+      </p:sp>
+      <p:pic>
+        <p:nvPicPr>
+          <p:cNvPr id="1027" name="Picture 3"/>
+          <p:cNvPicPr>
+            <a:picLocks noChangeAspect="1" noChangeArrowheads="1"/>
+          </p:cNvPicPr>
+          <p:nvPr/>
+        </p:nvPicPr>
+        <p:blipFill>
+          <a:blip r:embed="rId5" cstate="print">
+            <a:clrChange>
+              <a:clrFrom>
+                <a:srgbClr val="FFFFFF"/>
+              </a:clrFrom>
+              <a:clrTo>
+                <a:srgbClr val="FFFFFF">
+                  <a:alpha val="0"/>
+                </a:srgbClr>
+              </a:clrTo>
+            </a:clrChange>
+          </a:blip>
+          <a:srcRect/>
+          <a:stretch>
+            <a:fillRect/>
+          </a:stretch>
+        </p:blipFill>
+        <p:spPr bwMode="auto">
+          <a:xfrm>
+            <a:off x="0" y="0"/>
+            <a:ext cx="85725" cy="219075"/>
+          </a:xfrm>
+          <a:prstGeom prst="rect">
+            <a:avLst/>
+          </a:prstGeom>
+          <a:noFill/>
+        </p:spPr>
+      </p:pic>
+      <p:sp>
+        <p:nvSpPr>
+          <p:cNvPr id="29" name="TextBox 28"/>
+          <p:cNvSpPr txBox="1"/>
+          <p:nvPr/>
+        </p:nvSpPr>
+        <p:spPr>
+          <a:xfrm>
+            <a:off x="5580112" y="1979548"/>
+            <a:ext cx="360040" cy="369332"/>
+          </a:xfrm>
+          <a:prstGeom prst="rect">
+            <a:avLst/>
+          </a:prstGeom>
+          <a:blipFill rotWithShape="1">
+            <a:blip r:embed="rId6" cstate="print"/>
+            <a:stretch>
+              <a:fillRect/>
+            </a:stretch>
+          </a:blipFill>
+        </p:spPr>
+        <p:txBody>
+          <a:bodyPr wrap="square" rtlCol="0">
+            <a:spAutoFit/>
+          </a:bodyPr>
+          <a:lstStyle/>
+          <a:p>
+            <a:endParaRPr lang="ru-RU" dirty="0">
+              <a:noFill/>
+            </a:endParaRPr>
+          </a:p>
+        </p:txBody>
+      </p:sp>
+      <p:cxnSp>
+        <p:nvCxnSpPr>
+          <p:cNvPr id="32" name="Straight Connector 56"/>
+          <p:cNvCxnSpPr>
+            <a:stCxn id="51" idx="1"/>
+          </p:cNvCxnSpPr>
+          <p:nvPr/>
+        </p:nvCxnSpPr>
+        <p:spPr>
+          <a:xfrm flipH="1" flipV="1">
+            <a:off x="2051720" y="2132856"/>
+            <a:ext cx="1820797" cy="1564166"/>
+          </a:xfrm>
+          <a:prstGeom prst="line">
+            <a:avLst/>
+          </a:prstGeom>
+          <a:ln>
+            <a:solidFill>
+              <a:schemeClr val="tx1"/>
+            </a:solidFill>
+            <a:prstDash val="lgDash"/>
+          </a:ln>
+        </p:spPr>
+        <p:style>
+          <a:lnRef idx="1">
+            <a:schemeClr val="accent1"/>
+          </a:lnRef>
+          <a:fillRef idx="0">
+            <a:schemeClr val="accent1"/>
+          </a:fillRef>
+          <a:effectRef idx="0">
+            <a:schemeClr val="accent1"/>
+          </a:effectRef>
+          <a:fontRef idx="minor">
+            <a:schemeClr val="tx1"/>
+          </a:fontRef>
+        </p:style>
+      </p:cxnSp>
+      <p:cxnSp>
+        <p:nvCxnSpPr>
+          <p:cNvPr id="42" name="Прямая со стрелкой 41"/>
+          <p:cNvCxnSpPr/>
+          <p:nvPr/>
+        </p:nvCxnSpPr>
+        <p:spPr>
+          <a:xfrm flipV="1">
+            <a:off x="3898375" y="2924944"/>
+            <a:ext cx="457601" cy="784754"/>
+          </a:xfrm>
+          <a:prstGeom prst="straightConnector1">
+            <a:avLst/>
+          </a:prstGeom>
+          <a:ln w="12700">
+            <a:solidFill>
+              <a:schemeClr val="tx1"/>
+            </a:solidFill>
+            <a:tailEnd type="stealth" w="med" len="lg"/>
+          </a:ln>
+        </p:spPr>
+        <p:style>
+          <a:lnRef idx="1">
+            <a:schemeClr val="accent1"/>
+          </a:lnRef>
+          <a:fillRef idx="0">
+            <a:schemeClr val="accent1"/>
+          </a:fillRef>
+          <a:effectRef idx="0">
+            <a:schemeClr val="accent1"/>
+          </a:effectRef>
+          <a:fontRef idx="minor">
+            <a:schemeClr val="tx1"/>
+          </a:fontRef>
+        </p:style>
+      </p:cxnSp>
+      <p:sp>
+        <p:nvSpPr>
+          <p:cNvPr id="51" name="Oval 55"/>
+          <p:cNvSpPr>
+            <a:spLocks noChangeAspect="1"/>
+          </p:cNvSpPr>
+          <p:nvPr/>
+        </p:nvSpPr>
+        <p:spPr>
+          <a:xfrm>
+            <a:off x="3863306" y="3687810"/>
+            <a:ext cx="62898" cy="62906"/>
+          </a:xfrm>
+          <a:prstGeom prst="ellipse">
+            <a:avLst/>
+          </a:prstGeom>
+          <a:solidFill>
+            <a:schemeClr val="tx1"/>
+          </a:solidFill>
+          <a:ln>
+            <a:noFill/>
+          </a:ln>
+        </p:spPr>
+        <p:style>
+          <a:lnRef idx="2">
+            <a:schemeClr val="accent1">
+              <a:shade val="50000"/>
+            </a:schemeClr>
+          </a:lnRef>
+          <a:fillRef idx="1">
+            <a:schemeClr val="accent1"/>
+          </a:fillRef>
+          <a:effectRef idx="0">
+            <a:schemeClr val="accent1"/>
+          </a:effectRef>
+          <a:fontRef idx="minor">
+            <a:schemeClr val="lt1"/>
+          </a:fontRef>
+        </p:style>
+        <p:txBody>
+          <a:bodyPr rtlCol="0" anchor="ctr"/>
+          <a:lstStyle/>
+          <a:p>
+            <a:pPr algn="ctr"/>
+            <a:endParaRPr lang="ru-RU"/>
+          </a:p>
+        </p:txBody>
+      </p:sp>
+      <p:sp>
+        <p:nvSpPr>
+          <p:cNvPr id="62" name="Полилиния 61"/>
+          <p:cNvSpPr/>
+          <p:nvPr/>
+        </p:nvSpPr>
+        <p:spPr>
+          <a:xfrm>
+            <a:off x="3238573" y="2652252"/>
+            <a:ext cx="1246079" cy="1457315"/>
+          </a:xfrm>
+          <a:custGeom>
+            <a:avLst/>
+            <a:gdLst>
+              <a:gd name="connsiteX0" fmla="*/ 0 w 1296144"/>
+              <a:gd name="connsiteY0" fmla="*/ 1008112 h 2016224"/>
+              <a:gd name="connsiteX1" fmla="*/ 102928 w 1296144"/>
+              <a:gd name="connsiteY1" fmla="*/ 462967 h 2016224"/>
+              <a:gd name="connsiteX2" fmla="*/ 648074 w 1296144"/>
+              <a:gd name="connsiteY2" fmla="*/ 0 h 2016224"/>
+              <a:gd name="connsiteX3" fmla="*/ 1193218 w 1296144"/>
+              <a:gd name="connsiteY3" fmla="*/ 462969 h 2016224"/>
+              <a:gd name="connsiteX4" fmla="*/ 1296145 w 1296144"/>
+              <a:gd name="connsiteY4" fmla="*/ 1008113 h 2016224"/>
+              <a:gd name="connsiteX5" fmla="*/ 1193217 w 1296144"/>
+              <a:gd name="connsiteY5" fmla="*/ 1553257 h 2016224"/>
+              <a:gd name="connsiteX6" fmla="*/ 648072 w 1296144"/>
+              <a:gd name="connsiteY6" fmla="*/ 2016225 h 2016224"/>
+              <a:gd name="connsiteX7" fmla="*/ 102928 w 1296144"/>
+              <a:gd name="connsiteY7" fmla="*/ 1553257 h 2016224"/>
+              <a:gd name="connsiteX8" fmla="*/ 0 w 1296144"/>
+              <a:gd name="connsiteY8" fmla="*/ 1008113 h 2016224"/>
+              <a:gd name="connsiteX9" fmla="*/ 0 w 1296144"/>
+              <a:gd name="connsiteY9" fmla="*/ 1008112 h 2016224"/>
+              <a:gd name="connsiteX0" fmla="*/ 0 w 1296145"/>
+              <a:gd name="connsiteY0" fmla="*/ 1008113 h 2016226"/>
+              <a:gd name="connsiteX1" fmla="*/ 102928 w 1296145"/>
+              <a:gd name="connsiteY1" fmla="*/ 462968 h 2016226"/>
+              <a:gd name="connsiteX2" fmla="*/ 648074 w 1296145"/>
+              <a:gd name="connsiteY2" fmla="*/ 1 h 2016226"/>
+              <a:gd name="connsiteX3" fmla="*/ 1193218 w 1296145"/>
+              <a:gd name="connsiteY3" fmla="*/ 462970 h 2016226"/>
+              <a:gd name="connsiteX4" fmla="*/ 1296145 w 1296145"/>
+              <a:gd name="connsiteY4" fmla="*/ 1008114 h 2016226"/>
+              <a:gd name="connsiteX5" fmla="*/ 1193217 w 1296145"/>
+              <a:gd name="connsiteY5" fmla="*/ 1553258 h 2016226"/>
+              <a:gd name="connsiteX6" fmla="*/ 648072 w 1296145"/>
+              <a:gd name="connsiteY6" fmla="*/ 2016226 h 2016226"/>
+              <a:gd name="connsiteX7" fmla="*/ 102928 w 1296145"/>
+              <a:gd name="connsiteY7" fmla="*/ 1553258 h 2016226"/>
+              <a:gd name="connsiteX8" fmla="*/ 50817 w 1296145"/>
+              <a:gd name="connsiteY8" fmla="*/ 1402813 h 2016226"/>
+              <a:gd name="connsiteX9" fmla="*/ 0 w 1296145"/>
+              <a:gd name="connsiteY9" fmla="*/ 1008114 h 2016226"/>
+              <a:gd name="connsiteX10" fmla="*/ 0 w 1296145"/>
+              <a:gd name="connsiteY10" fmla="*/ 1008113 h 2016226"/>
+              <a:gd name="connsiteX0" fmla="*/ 50817 w 1296145"/>
+              <a:gd name="connsiteY0" fmla="*/ 1402813 h 2016226"/>
+              <a:gd name="connsiteX1" fmla="*/ 0 w 1296145"/>
+              <a:gd name="connsiteY1" fmla="*/ 1008114 h 2016226"/>
+              <a:gd name="connsiteX2" fmla="*/ 0 w 1296145"/>
+              <a:gd name="connsiteY2" fmla="*/ 1008113 h 2016226"/>
+              <a:gd name="connsiteX3" fmla="*/ 102928 w 1296145"/>
+              <a:gd name="connsiteY3" fmla="*/ 462968 h 2016226"/>
+              <a:gd name="connsiteX4" fmla="*/ 648074 w 1296145"/>
+              <a:gd name="connsiteY4" fmla="*/ 1 h 2016226"/>
+              <a:gd name="connsiteX5" fmla="*/ 1193218 w 1296145"/>
+              <a:gd name="connsiteY5" fmla="*/ 462970 h 2016226"/>
+              <a:gd name="connsiteX6" fmla="*/ 1296145 w 1296145"/>
+              <a:gd name="connsiteY6" fmla="*/ 1008114 h 2016226"/>
+              <a:gd name="connsiteX7" fmla="*/ 1193217 w 1296145"/>
+              <a:gd name="connsiteY7" fmla="*/ 1553258 h 2016226"/>
+              <a:gd name="connsiteX8" fmla="*/ 648072 w 1296145"/>
+              <a:gd name="connsiteY8" fmla="*/ 2016226 h 2016226"/>
+              <a:gd name="connsiteX9" fmla="*/ 102928 w 1296145"/>
+              <a:gd name="connsiteY9" fmla="*/ 1553258 h 2016226"/>
+              <a:gd name="connsiteX10" fmla="*/ 142257 w 1296145"/>
+              <a:gd name="connsiteY10" fmla="*/ 1494253 h 2016226"/>
+              <a:gd name="connsiteX0" fmla="*/ 52721 w 1298049"/>
+              <a:gd name="connsiteY0" fmla="*/ 1402813 h 2016226"/>
+              <a:gd name="connsiteX1" fmla="*/ 1904 w 1298049"/>
+              <a:gd name="connsiteY1" fmla="*/ 1008114 h 2016226"/>
+              <a:gd name="connsiteX2" fmla="*/ 1904 w 1298049"/>
+              <a:gd name="connsiteY2" fmla="*/ 1008113 h 2016226"/>
+              <a:gd name="connsiteX3" fmla="*/ 104832 w 1298049"/>
+              <a:gd name="connsiteY3" fmla="*/ 462968 h 2016226"/>
+              <a:gd name="connsiteX4" fmla="*/ 649978 w 1298049"/>
+              <a:gd name="connsiteY4" fmla="*/ 1 h 2016226"/>
+              <a:gd name="connsiteX5" fmla="*/ 1195122 w 1298049"/>
+              <a:gd name="connsiteY5" fmla="*/ 462970 h 2016226"/>
+              <a:gd name="connsiteX6" fmla="*/ 1298049 w 1298049"/>
+              <a:gd name="connsiteY6" fmla="*/ 1008114 h 2016226"/>
+              <a:gd name="connsiteX7" fmla="*/ 1195121 w 1298049"/>
+              <a:gd name="connsiteY7" fmla="*/ 1553258 h 2016226"/>
+              <a:gd name="connsiteX8" fmla="*/ 649976 w 1298049"/>
+              <a:gd name="connsiteY8" fmla="*/ 2016226 h 2016226"/>
+              <a:gd name="connsiteX9" fmla="*/ 104832 w 1298049"/>
+              <a:gd name="connsiteY9" fmla="*/ 1553258 h 2016226"/>
+              <a:gd name="connsiteX10" fmla="*/ 144161 w 1298049"/>
+              <a:gd name="connsiteY10" fmla="*/ 1494253 h 2016226"/>
+              <a:gd name="connsiteX0" fmla="*/ 50817 w 1296145"/>
+              <a:gd name="connsiteY0" fmla="*/ 1402813 h 2016226"/>
+              <a:gd name="connsiteX1" fmla="*/ 0 w 1296145"/>
+              <a:gd name="connsiteY1" fmla="*/ 1008114 h 2016226"/>
+              <a:gd name="connsiteX2" fmla="*/ 0 w 1296145"/>
+              <a:gd name="connsiteY2" fmla="*/ 1008113 h 2016226"/>
+              <a:gd name="connsiteX3" fmla="*/ 102928 w 1296145"/>
+              <a:gd name="connsiteY3" fmla="*/ 462968 h 2016226"/>
+              <a:gd name="connsiteX4" fmla="*/ 648074 w 1296145"/>
+              <a:gd name="connsiteY4" fmla="*/ 1 h 2016226"/>
+              <a:gd name="connsiteX5" fmla="*/ 1193218 w 1296145"/>
+              <a:gd name="connsiteY5" fmla="*/ 462970 h 2016226"/>
+              <a:gd name="connsiteX6" fmla="*/ 1296145 w 1296145"/>
+              <a:gd name="connsiteY6" fmla="*/ 1008114 h 2016226"/>
+              <a:gd name="connsiteX7" fmla="*/ 1193217 w 1296145"/>
+              <a:gd name="connsiteY7" fmla="*/ 1553258 h 2016226"/>
+              <a:gd name="connsiteX8" fmla="*/ 648072 w 1296145"/>
+              <a:gd name="connsiteY8" fmla="*/ 2016226 h 2016226"/>
+              <a:gd name="connsiteX9" fmla="*/ 102928 w 1296145"/>
+              <a:gd name="connsiteY9" fmla="*/ 1553258 h 2016226"/>
+              <a:gd name="connsiteX10" fmla="*/ 142257 w 1296145"/>
+              <a:gd name="connsiteY10" fmla="*/ 1494253 h 2016226"/>
+              <a:gd name="connsiteX0" fmla="*/ 56347 w 1301675"/>
+              <a:gd name="connsiteY0" fmla="*/ 1402813 h 2016226"/>
+              <a:gd name="connsiteX1" fmla="*/ 5530 w 1301675"/>
+              <a:gd name="connsiteY1" fmla="*/ 1008114 h 2016226"/>
+              <a:gd name="connsiteX2" fmla="*/ 5530 w 1301675"/>
+              <a:gd name="connsiteY2" fmla="*/ 1008113 h 2016226"/>
+              <a:gd name="connsiteX3" fmla="*/ 108458 w 1301675"/>
+              <a:gd name="connsiteY3" fmla="*/ 462968 h 2016226"/>
+              <a:gd name="connsiteX4" fmla="*/ 653604 w 1301675"/>
+              <a:gd name="connsiteY4" fmla="*/ 1 h 2016226"/>
+              <a:gd name="connsiteX5" fmla="*/ 1198748 w 1301675"/>
+              <a:gd name="connsiteY5" fmla="*/ 462970 h 2016226"/>
+              <a:gd name="connsiteX6" fmla="*/ 1301675 w 1301675"/>
+              <a:gd name="connsiteY6" fmla="*/ 1008114 h 2016226"/>
+              <a:gd name="connsiteX7" fmla="*/ 1198747 w 1301675"/>
+              <a:gd name="connsiteY7" fmla="*/ 1553258 h 2016226"/>
+              <a:gd name="connsiteX8" fmla="*/ 653602 w 1301675"/>
+              <a:gd name="connsiteY8" fmla="*/ 2016226 h 2016226"/>
+              <a:gd name="connsiteX9" fmla="*/ 108458 w 1301675"/>
+              <a:gd name="connsiteY9" fmla="*/ 1553258 h 2016226"/>
+              <a:gd name="connsiteX10" fmla="*/ 147787 w 1301675"/>
+              <a:gd name="connsiteY10" fmla="*/ 1494253 h 2016226"/>
+              <a:gd name="connsiteX0" fmla="*/ 55092 w 1300420"/>
+              <a:gd name="connsiteY0" fmla="*/ 1402813 h 2016226"/>
+              <a:gd name="connsiteX1" fmla="*/ 4275 w 1300420"/>
+              <a:gd name="connsiteY1" fmla="*/ 1008114 h 2016226"/>
+              <a:gd name="connsiteX2" fmla="*/ 4275 w 1300420"/>
+              <a:gd name="connsiteY2" fmla="*/ 1008113 h 2016226"/>
+              <a:gd name="connsiteX3" fmla="*/ 107203 w 1300420"/>
+              <a:gd name="connsiteY3" fmla="*/ 462968 h 2016226"/>
+              <a:gd name="connsiteX4" fmla="*/ 652349 w 1300420"/>
+              <a:gd name="connsiteY4" fmla="*/ 1 h 2016226"/>
+              <a:gd name="connsiteX5" fmla="*/ 1197493 w 1300420"/>
+              <a:gd name="connsiteY5" fmla="*/ 462970 h 2016226"/>
+              <a:gd name="connsiteX6" fmla="*/ 1300420 w 1300420"/>
+              <a:gd name="connsiteY6" fmla="*/ 1008114 h 2016226"/>
+              <a:gd name="connsiteX7" fmla="*/ 1197492 w 1300420"/>
+              <a:gd name="connsiteY7" fmla="*/ 1553258 h 2016226"/>
+              <a:gd name="connsiteX8" fmla="*/ 652347 w 1300420"/>
+              <a:gd name="connsiteY8" fmla="*/ 2016226 h 2016226"/>
+              <a:gd name="connsiteX9" fmla="*/ 107203 w 1300420"/>
+              <a:gd name="connsiteY9" fmla="*/ 1553258 h 2016226"/>
+              <a:gd name="connsiteX10" fmla="*/ 146532 w 1300420"/>
+              <a:gd name="connsiteY10" fmla="*/ 1494253 h 2016226"/>
+              <a:gd name="connsiteX0" fmla="*/ 53837 w 1299165"/>
+              <a:gd name="connsiteY0" fmla="*/ 1402813 h 2016226"/>
+              <a:gd name="connsiteX1" fmla="*/ 3020 w 1299165"/>
+              <a:gd name="connsiteY1" fmla="*/ 1008114 h 2016226"/>
+              <a:gd name="connsiteX2" fmla="*/ 3020 w 1299165"/>
+              <a:gd name="connsiteY2" fmla="*/ 1008113 h 2016226"/>
+              <a:gd name="connsiteX3" fmla="*/ 105948 w 1299165"/>
+              <a:gd name="connsiteY3" fmla="*/ 462968 h 2016226"/>
+              <a:gd name="connsiteX4" fmla="*/ 651094 w 1299165"/>
+              <a:gd name="connsiteY4" fmla="*/ 1 h 2016226"/>
+              <a:gd name="connsiteX5" fmla="*/ 1196238 w 1299165"/>
+              <a:gd name="connsiteY5" fmla="*/ 462970 h 2016226"/>
+              <a:gd name="connsiteX6" fmla="*/ 1299165 w 1299165"/>
+              <a:gd name="connsiteY6" fmla="*/ 1008114 h 2016226"/>
+              <a:gd name="connsiteX7" fmla="*/ 1196237 w 1299165"/>
+              <a:gd name="connsiteY7" fmla="*/ 1553258 h 2016226"/>
+              <a:gd name="connsiteX8" fmla="*/ 651092 w 1299165"/>
+              <a:gd name="connsiteY8" fmla="*/ 2016226 h 2016226"/>
+              <a:gd name="connsiteX9" fmla="*/ 105948 w 1299165"/>
+              <a:gd name="connsiteY9" fmla="*/ 1553258 h 2016226"/>
+              <a:gd name="connsiteX10" fmla="*/ 145277 w 1299165"/>
+              <a:gd name="connsiteY10" fmla="*/ 1494253 h 2016226"/>
+              <a:gd name="connsiteX0" fmla="*/ 53837 w 1307703"/>
+              <a:gd name="connsiteY0" fmla="*/ 1402813 h 2016226"/>
+              <a:gd name="connsiteX1" fmla="*/ 3020 w 1307703"/>
+              <a:gd name="connsiteY1" fmla="*/ 1008114 h 2016226"/>
+              <a:gd name="connsiteX2" fmla="*/ 3020 w 1307703"/>
+              <a:gd name="connsiteY2" fmla="*/ 1008113 h 2016226"/>
+              <a:gd name="connsiteX3" fmla="*/ 105948 w 1307703"/>
+              <a:gd name="connsiteY3" fmla="*/ 462968 h 2016226"/>
+              <a:gd name="connsiteX4" fmla="*/ 651094 w 1307703"/>
+              <a:gd name="connsiteY4" fmla="*/ 1 h 2016226"/>
+              <a:gd name="connsiteX5" fmla="*/ 1196238 w 1307703"/>
+              <a:gd name="connsiteY5" fmla="*/ 462970 h 2016226"/>
+              <a:gd name="connsiteX6" fmla="*/ 1247465 w 1307703"/>
+              <a:gd name="connsiteY6" fmla="*/ 614219 h 2016226"/>
+              <a:gd name="connsiteX7" fmla="*/ 1299165 w 1307703"/>
+              <a:gd name="connsiteY7" fmla="*/ 1008114 h 2016226"/>
+              <a:gd name="connsiteX8" fmla="*/ 1196237 w 1307703"/>
+              <a:gd name="connsiteY8" fmla="*/ 1553258 h 2016226"/>
+              <a:gd name="connsiteX9" fmla="*/ 651092 w 1307703"/>
+              <a:gd name="connsiteY9" fmla="*/ 2016226 h 2016226"/>
+              <a:gd name="connsiteX10" fmla="*/ 105948 w 1307703"/>
+              <a:gd name="connsiteY10" fmla="*/ 1553258 h 2016226"/>
+              <a:gd name="connsiteX11" fmla="*/ 145277 w 1307703"/>
+              <a:gd name="connsiteY11" fmla="*/ 1494253 h 2016226"/>
+              <a:gd name="connsiteX0" fmla="*/ 53837 w 1307703"/>
+              <a:gd name="connsiteY0" fmla="*/ 1402813 h 2016226"/>
+              <a:gd name="connsiteX1" fmla="*/ 3020 w 1307703"/>
+              <a:gd name="connsiteY1" fmla="*/ 1008114 h 2016226"/>
+              <a:gd name="connsiteX2" fmla="*/ 3020 w 1307703"/>
+              <a:gd name="connsiteY2" fmla="*/ 1008113 h 2016226"/>
+              <a:gd name="connsiteX3" fmla="*/ 105948 w 1307703"/>
+              <a:gd name="connsiteY3" fmla="*/ 462968 h 2016226"/>
+              <a:gd name="connsiteX4" fmla="*/ 651094 w 1307703"/>
+              <a:gd name="connsiteY4" fmla="*/ 1 h 2016226"/>
+              <a:gd name="connsiteX5" fmla="*/ 1196238 w 1307703"/>
+              <a:gd name="connsiteY5" fmla="*/ 462970 h 2016226"/>
+              <a:gd name="connsiteX6" fmla="*/ 1247465 w 1307703"/>
+              <a:gd name="connsiteY6" fmla="*/ 614219 h 2016226"/>
+              <a:gd name="connsiteX7" fmla="*/ 1299165 w 1307703"/>
+              <a:gd name="connsiteY7" fmla="*/ 1008114 h 2016226"/>
+              <a:gd name="connsiteX8" fmla="*/ 1196237 w 1307703"/>
+              <a:gd name="connsiteY8" fmla="*/ 1553258 h 2016226"/>
+              <a:gd name="connsiteX9" fmla="*/ 651092 w 1307703"/>
+              <a:gd name="connsiteY9" fmla="*/ 2016226 h 2016226"/>
+              <a:gd name="connsiteX10" fmla="*/ 105948 w 1307703"/>
+              <a:gd name="connsiteY10" fmla="*/ 1553258 h 2016226"/>
+              <a:gd name="connsiteX11" fmla="*/ 145277 w 1307703"/>
+              <a:gd name="connsiteY11" fmla="*/ 1494253 h 2016226"/>
+              <a:gd name="connsiteX0" fmla="*/ 53837 w 1307703"/>
+              <a:gd name="connsiteY0" fmla="*/ 1402813 h 2016226"/>
+              <a:gd name="connsiteX1" fmla="*/ 3020 w 1307703"/>
+              <a:gd name="connsiteY1" fmla="*/ 1008114 h 2016226"/>
+              <a:gd name="connsiteX2" fmla="*/ 3020 w 1307703"/>
+              <a:gd name="connsiteY2" fmla="*/ 1008113 h 2016226"/>
+              <a:gd name="connsiteX3" fmla="*/ 105948 w 1307703"/>
+              <a:gd name="connsiteY3" fmla="*/ 462968 h 2016226"/>
+              <a:gd name="connsiteX4" fmla="*/ 651094 w 1307703"/>
+              <a:gd name="connsiteY4" fmla="*/ 1 h 2016226"/>
+              <a:gd name="connsiteX5" fmla="*/ 1196238 w 1307703"/>
+              <a:gd name="connsiteY5" fmla="*/ 462970 h 2016226"/>
+              <a:gd name="connsiteX6" fmla="*/ 1247465 w 1307703"/>
+              <a:gd name="connsiteY6" fmla="*/ 614219 h 2016226"/>
+              <a:gd name="connsiteX7" fmla="*/ 1299165 w 1307703"/>
+              <a:gd name="connsiteY7" fmla="*/ 1008114 h 2016226"/>
+              <a:gd name="connsiteX8" fmla="*/ 1196237 w 1307703"/>
+              <a:gd name="connsiteY8" fmla="*/ 1553258 h 2016226"/>
+              <a:gd name="connsiteX9" fmla="*/ 651092 w 1307703"/>
+              <a:gd name="connsiteY9" fmla="*/ 2016226 h 2016226"/>
+              <a:gd name="connsiteX10" fmla="*/ 105948 w 1307703"/>
+              <a:gd name="connsiteY10" fmla="*/ 1553258 h 2016226"/>
+              <a:gd name="connsiteX0" fmla="*/ 53837 w 1307703"/>
+              <a:gd name="connsiteY0" fmla="*/ 1402813 h 2016226"/>
+              <a:gd name="connsiteX1" fmla="*/ 3020 w 1307703"/>
+              <a:gd name="connsiteY1" fmla="*/ 1008114 h 2016226"/>
+              <a:gd name="connsiteX2" fmla="*/ 3020 w 1307703"/>
+              <a:gd name="connsiteY2" fmla="*/ 1008113 h 2016226"/>
+              <a:gd name="connsiteX3" fmla="*/ 105948 w 1307703"/>
+              <a:gd name="connsiteY3" fmla="*/ 462968 h 2016226"/>
+              <a:gd name="connsiteX4" fmla="*/ 651094 w 1307703"/>
+              <a:gd name="connsiteY4" fmla="*/ 1 h 2016226"/>
+              <a:gd name="connsiteX5" fmla="*/ 1196238 w 1307703"/>
+              <a:gd name="connsiteY5" fmla="*/ 462970 h 2016226"/>
+              <a:gd name="connsiteX6" fmla="*/ 1247465 w 1307703"/>
+              <a:gd name="connsiteY6" fmla="*/ 614219 h 2016226"/>
+              <a:gd name="connsiteX7" fmla="*/ 1299165 w 1307703"/>
+              <a:gd name="connsiteY7" fmla="*/ 1008114 h 2016226"/>
+              <a:gd name="connsiteX8" fmla="*/ 1196237 w 1307703"/>
+              <a:gd name="connsiteY8" fmla="*/ 1553258 h 2016226"/>
+              <a:gd name="connsiteX9" fmla="*/ 651092 w 1307703"/>
+              <a:gd name="connsiteY9" fmla="*/ 2016226 h 2016226"/>
+              <a:gd name="connsiteX0" fmla="*/ 53837 w 1398560"/>
+              <a:gd name="connsiteY0" fmla="*/ 1402813 h 2016226"/>
+              <a:gd name="connsiteX1" fmla="*/ 3020 w 1398560"/>
+              <a:gd name="connsiteY1" fmla="*/ 1008114 h 2016226"/>
+              <a:gd name="connsiteX2" fmla="*/ 3020 w 1398560"/>
+              <a:gd name="connsiteY2" fmla="*/ 1008113 h 2016226"/>
+              <a:gd name="connsiteX3" fmla="*/ 105948 w 1398560"/>
+              <a:gd name="connsiteY3" fmla="*/ 462968 h 2016226"/>
+              <a:gd name="connsiteX4" fmla="*/ 651094 w 1398560"/>
+              <a:gd name="connsiteY4" fmla="*/ 1 h 2016226"/>
+              <a:gd name="connsiteX5" fmla="*/ 1196238 w 1398560"/>
+              <a:gd name="connsiteY5" fmla="*/ 462970 h 2016226"/>
+              <a:gd name="connsiteX6" fmla="*/ 1247465 w 1398560"/>
+              <a:gd name="connsiteY6" fmla="*/ 614219 h 2016226"/>
+              <a:gd name="connsiteX7" fmla="*/ 1299165 w 1398560"/>
+              <a:gd name="connsiteY7" fmla="*/ 1008114 h 2016226"/>
+              <a:gd name="connsiteX8" fmla="*/ 651092 w 1398560"/>
+              <a:gd name="connsiteY8" fmla="*/ 2016226 h 2016226"/>
+              <a:gd name="connsiteX0" fmla="*/ 53837 w 1398560"/>
+              <a:gd name="connsiteY0" fmla="*/ 1402813 h 1402813"/>
+              <a:gd name="connsiteX1" fmla="*/ 3020 w 1398560"/>
+              <a:gd name="connsiteY1" fmla="*/ 1008114 h 1402813"/>
+              <a:gd name="connsiteX2" fmla="*/ 3020 w 1398560"/>
+              <a:gd name="connsiteY2" fmla="*/ 1008113 h 1402813"/>
+              <a:gd name="connsiteX3" fmla="*/ 105948 w 1398560"/>
+              <a:gd name="connsiteY3" fmla="*/ 462968 h 1402813"/>
+              <a:gd name="connsiteX4" fmla="*/ 651094 w 1398560"/>
+              <a:gd name="connsiteY4" fmla="*/ 1 h 1402813"/>
+              <a:gd name="connsiteX5" fmla="*/ 1196238 w 1398560"/>
+              <a:gd name="connsiteY5" fmla="*/ 462970 h 1402813"/>
+              <a:gd name="connsiteX6" fmla="*/ 1247465 w 1398560"/>
+              <a:gd name="connsiteY6" fmla="*/ 614219 h 1402813"/>
+              <a:gd name="connsiteX7" fmla="*/ 1299165 w 1398560"/>
+              <a:gd name="connsiteY7" fmla="*/ 1008114 h 1402813"/>
+              <a:gd name="connsiteX0" fmla="*/ 53837 w 1299165"/>
+              <a:gd name="connsiteY0" fmla="*/ 1402813 h 1402813"/>
+              <a:gd name="connsiteX1" fmla="*/ 3020 w 1299165"/>
+              <a:gd name="connsiteY1" fmla="*/ 1008114 h 1402813"/>
+              <a:gd name="connsiteX2" fmla="*/ 3020 w 1299165"/>
+              <a:gd name="connsiteY2" fmla="*/ 1008113 h 1402813"/>
+              <a:gd name="connsiteX3" fmla="*/ 105948 w 1299165"/>
+              <a:gd name="connsiteY3" fmla="*/ 462968 h 1402813"/>
+              <a:gd name="connsiteX4" fmla="*/ 651094 w 1299165"/>
+              <a:gd name="connsiteY4" fmla="*/ 1 h 1402813"/>
+              <a:gd name="connsiteX5" fmla="*/ 1196238 w 1299165"/>
+              <a:gd name="connsiteY5" fmla="*/ 462970 h 1402813"/>
+              <a:gd name="connsiteX6" fmla="*/ 1247465 w 1299165"/>
+              <a:gd name="connsiteY6" fmla="*/ 614219 h 1402813"/>
+              <a:gd name="connsiteX7" fmla="*/ 1299165 w 1299165"/>
+              <a:gd name="connsiteY7" fmla="*/ 1008114 h 1402813"/>
+              <a:gd name="connsiteX0" fmla="*/ 53837 w 1393116"/>
+              <a:gd name="connsiteY0" fmla="*/ 1402813 h 1402813"/>
+              <a:gd name="connsiteX1" fmla="*/ 3020 w 1393116"/>
+              <a:gd name="connsiteY1" fmla="*/ 1008114 h 1402813"/>
+              <a:gd name="connsiteX2" fmla="*/ 3020 w 1393116"/>
+              <a:gd name="connsiteY2" fmla="*/ 1008113 h 1402813"/>
+              <a:gd name="connsiteX3" fmla="*/ 105948 w 1393116"/>
+              <a:gd name="connsiteY3" fmla="*/ 462968 h 1402813"/>
+              <a:gd name="connsiteX4" fmla="*/ 651094 w 1393116"/>
+              <a:gd name="connsiteY4" fmla="*/ 1 h 1402813"/>
+              <a:gd name="connsiteX5" fmla="*/ 1196238 w 1393116"/>
+              <a:gd name="connsiteY5" fmla="*/ 462970 h 1402813"/>
+              <a:gd name="connsiteX6" fmla="*/ 1247465 w 1393116"/>
+              <a:gd name="connsiteY6" fmla="*/ 614219 h 1402813"/>
+              <a:gd name="connsiteX7" fmla="*/ 1393116 w 1393116"/>
+              <a:gd name="connsiteY7" fmla="*/ 864098 h 1402813"/>
+              <a:gd name="connsiteX0" fmla="*/ 53837 w 1393116"/>
+              <a:gd name="connsiteY0" fmla="*/ 1419966 h 1419966"/>
+              <a:gd name="connsiteX1" fmla="*/ 3020 w 1393116"/>
+              <a:gd name="connsiteY1" fmla="*/ 1025267 h 1419966"/>
+              <a:gd name="connsiteX2" fmla="*/ 3020 w 1393116"/>
+              <a:gd name="connsiteY2" fmla="*/ 1025266 h 1419966"/>
+              <a:gd name="connsiteX3" fmla="*/ 105948 w 1393116"/>
+              <a:gd name="connsiteY3" fmla="*/ 480121 h 1419966"/>
+              <a:gd name="connsiteX4" fmla="*/ 651094 w 1393116"/>
+              <a:gd name="connsiteY4" fmla="*/ 17154 h 1419966"/>
+              <a:gd name="connsiteX5" fmla="*/ 1105083 w 1393116"/>
+              <a:gd name="connsiteY5" fmla="*/ 377195 h 1419966"/>
+              <a:gd name="connsiteX6" fmla="*/ 1247465 w 1393116"/>
+              <a:gd name="connsiteY6" fmla="*/ 631372 h 1419966"/>
+              <a:gd name="connsiteX7" fmla="*/ 1393116 w 1393116"/>
+              <a:gd name="connsiteY7" fmla="*/ 881251 h 1419966"/>
+              <a:gd name="connsiteX0" fmla="*/ 53837 w 1393116"/>
+              <a:gd name="connsiteY0" fmla="*/ 1419966 h 1419966"/>
+              <a:gd name="connsiteX1" fmla="*/ 3020 w 1393116"/>
+              <a:gd name="connsiteY1" fmla="*/ 1025267 h 1419966"/>
+              <a:gd name="connsiteX2" fmla="*/ 3020 w 1393116"/>
+              <a:gd name="connsiteY2" fmla="*/ 1025266 h 1419966"/>
+              <a:gd name="connsiteX3" fmla="*/ 105948 w 1393116"/>
+              <a:gd name="connsiteY3" fmla="*/ 480121 h 1419966"/>
+              <a:gd name="connsiteX4" fmla="*/ 651094 w 1393116"/>
+              <a:gd name="connsiteY4" fmla="*/ 17154 h 1419966"/>
+              <a:gd name="connsiteX5" fmla="*/ 1105083 w 1393116"/>
+              <a:gd name="connsiteY5" fmla="*/ 377195 h 1419966"/>
+              <a:gd name="connsiteX6" fmla="*/ 1247465 w 1393116"/>
+              <a:gd name="connsiteY6" fmla="*/ 631372 h 1419966"/>
+              <a:gd name="connsiteX7" fmla="*/ 1393116 w 1393116"/>
+              <a:gd name="connsiteY7" fmla="*/ 881251 h 1419966"/>
+              <a:gd name="connsiteX0" fmla="*/ 53837 w 1393116"/>
+              <a:gd name="connsiteY0" fmla="*/ 1419966 h 1419966"/>
+              <a:gd name="connsiteX1" fmla="*/ 3020 w 1393116"/>
+              <a:gd name="connsiteY1" fmla="*/ 1025267 h 1419966"/>
+              <a:gd name="connsiteX2" fmla="*/ 3020 w 1393116"/>
+              <a:gd name="connsiteY2" fmla="*/ 1025266 h 1419966"/>
+              <a:gd name="connsiteX3" fmla="*/ 105948 w 1393116"/>
+              <a:gd name="connsiteY3" fmla="*/ 480121 h 1419966"/>
+              <a:gd name="connsiteX4" fmla="*/ 651094 w 1393116"/>
+              <a:gd name="connsiteY4" fmla="*/ 17154 h 1419966"/>
+              <a:gd name="connsiteX5" fmla="*/ 1105083 w 1393116"/>
+              <a:gd name="connsiteY5" fmla="*/ 377195 h 1419966"/>
+              <a:gd name="connsiteX6" fmla="*/ 1247465 w 1393116"/>
+              <a:gd name="connsiteY6" fmla="*/ 631372 h 1419966"/>
+              <a:gd name="connsiteX7" fmla="*/ 1393116 w 1393116"/>
+              <a:gd name="connsiteY7" fmla="*/ 881251 h 1419966"/>
+              <a:gd name="connsiteX0" fmla="*/ 53837 w 1393116"/>
+              <a:gd name="connsiteY0" fmla="*/ 1419966 h 1419966"/>
+              <a:gd name="connsiteX1" fmla="*/ 3020 w 1393116"/>
+              <a:gd name="connsiteY1" fmla="*/ 1025267 h 1419966"/>
+              <a:gd name="connsiteX2" fmla="*/ 3020 w 1393116"/>
+              <a:gd name="connsiteY2" fmla="*/ 1025266 h 1419966"/>
+              <a:gd name="connsiteX3" fmla="*/ 105948 w 1393116"/>
+              <a:gd name="connsiteY3" fmla="*/ 480121 h 1419966"/>
+              <a:gd name="connsiteX4" fmla="*/ 651094 w 1393116"/>
+              <a:gd name="connsiteY4" fmla="*/ 17154 h 1419966"/>
+              <a:gd name="connsiteX5" fmla="*/ 1105083 w 1393116"/>
+              <a:gd name="connsiteY5" fmla="*/ 377195 h 1419966"/>
+              <a:gd name="connsiteX6" fmla="*/ 1247465 w 1393116"/>
+              <a:gd name="connsiteY6" fmla="*/ 631372 h 1419966"/>
+              <a:gd name="connsiteX7" fmla="*/ 1393116 w 1393116"/>
+              <a:gd name="connsiteY7" fmla="*/ 881251 h 1419966"/>
+              <a:gd name="connsiteX0" fmla="*/ 53837 w 1393116"/>
+              <a:gd name="connsiteY0" fmla="*/ 1419966 h 1419966"/>
+              <a:gd name="connsiteX1" fmla="*/ 3020 w 1393116"/>
+              <a:gd name="connsiteY1" fmla="*/ 1025267 h 1419966"/>
+              <a:gd name="connsiteX2" fmla="*/ 3020 w 1393116"/>
+              <a:gd name="connsiteY2" fmla="*/ 1025266 h 1419966"/>
+              <a:gd name="connsiteX3" fmla="*/ 105948 w 1393116"/>
+              <a:gd name="connsiteY3" fmla="*/ 480121 h 1419966"/>
+              <a:gd name="connsiteX4" fmla="*/ 651094 w 1393116"/>
+              <a:gd name="connsiteY4" fmla="*/ 17154 h 1419966"/>
+              <a:gd name="connsiteX5" fmla="*/ 1105083 w 1393116"/>
+              <a:gd name="connsiteY5" fmla="*/ 377195 h 1419966"/>
+              <a:gd name="connsiteX6" fmla="*/ 1247465 w 1393116"/>
+              <a:gd name="connsiteY6" fmla="*/ 631372 h 1419966"/>
+              <a:gd name="connsiteX7" fmla="*/ 1393116 w 1393116"/>
+              <a:gd name="connsiteY7" fmla="*/ 881251 h 1419966"/>
+              <a:gd name="connsiteX0" fmla="*/ 53837 w 1393116"/>
+              <a:gd name="connsiteY0" fmla="*/ 1419966 h 1419966"/>
+              <a:gd name="connsiteX1" fmla="*/ 3020 w 1393116"/>
+              <a:gd name="connsiteY1" fmla="*/ 1025267 h 1419966"/>
+              <a:gd name="connsiteX2" fmla="*/ 3020 w 1393116"/>
+              <a:gd name="connsiteY2" fmla="*/ 1025266 h 1419966"/>
+              <a:gd name="connsiteX3" fmla="*/ 105948 w 1393116"/>
+              <a:gd name="connsiteY3" fmla="*/ 480121 h 1419966"/>
+              <a:gd name="connsiteX4" fmla="*/ 651094 w 1393116"/>
+              <a:gd name="connsiteY4" fmla="*/ 17154 h 1419966"/>
+              <a:gd name="connsiteX5" fmla="*/ 1177091 w 1393116"/>
+              <a:gd name="connsiteY5" fmla="*/ 377195 h 1419966"/>
+              <a:gd name="connsiteX6" fmla="*/ 1247465 w 1393116"/>
+              <a:gd name="connsiteY6" fmla="*/ 631372 h 1419966"/>
+              <a:gd name="connsiteX7" fmla="*/ 1393116 w 1393116"/>
+              <a:gd name="connsiteY7" fmla="*/ 881251 h 1419966"/>
+              <a:gd name="connsiteX0" fmla="*/ 53837 w 1393116"/>
+              <a:gd name="connsiteY0" fmla="*/ 1419966 h 1419966"/>
+              <a:gd name="connsiteX1" fmla="*/ 3020 w 1393116"/>
+              <a:gd name="connsiteY1" fmla="*/ 1025267 h 1419966"/>
+              <a:gd name="connsiteX2" fmla="*/ 3020 w 1393116"/>
+              <a:gd name="connsiteY2" fmla="*/ 1025266 h 1419966"/>
+              <a:gd name="connsiteX3" fmla="*/ 105948 w 1393116"/>
+              <a:gd name="connsiteY3" fmla="*/ 480121 h 1419966"/>
+              <a:gd name="connsiteX4" fmla="*/ 651094 w 1393116"/>
+              <a:gd name="connsiteY4" fmla="*/ 17154 h 1419966"/>
+              <a:gd name="connsiteX5" fmla="*/ 1177091 w 1393116"/>
+              <a:gd name="connsiteY5" fmla="*/ 377195 h 1419966"/>
+              <a:gd name="connsiteX6" fmla="*/ 1247465 w 1393116"/>
+              <a:gd name="connsiteY6" fmla="*/ 631372 h 1419966"/>
+              <a:gd name="connsiteX7" fmla="*/ 1393116 w 1393116"/>
+              <a:gd name="connsiteY7" fmla="*/ 881251 h 1419966"/>
+              <a:gd name="connsiteX0" fmla="*/ 53837 w 1393116"/>
+              <a:gd name="connsiteY0" fmla="*/ 1419966 h 1419966"/>
+              <a:gd name="connsiteX1" fmla="*/ 3020 w 1393116"/>
+              <a:gd name="connsiteY1" fmla="*/ 1025267 h 1419966"/>
+              <a:gd name="connsiteX2" fmla="*/ 3020 w 1393116"/>
+              <a:gd name="connsiteY2" fmla="*/ 1025266 h 1419966"/>
+              <a:gd name="connsiteX3" fmla="*/ 105948 w 1393116"/>
+              <a:gd name="connsiteY3" fmla="*/ 480121 h 1419966"/>
+              <a:gd name="connsiteX4" fmla="*/ 651094 w 1393116"/>
+              <a:gd name="connsiteY4" fmla="*/ 17154 h 1419966"/>
+              <a:gd name="connsiteX5" fmla="*/ 1177091 w 1393116"/>
+              <a:gd name="connsiteY5" fmla="*/ 377195 h 1419966"/>
+              <a:gd name="connsiteX6" fmla="*/ 1247465 w 1393116"/>
+              <a:gd name="connsiteY6" fmla="*/ 631372 h 1419966"/>
+              <a:gd name="connsiteX7" fmla="*/ 1393116 w 1393116"/>
+              <a:gd name="connsiteY7" fmla="*/ 881251 h 1419966"/>
+              <a:gd name="connsiteX0" fmla="*/ 53837 w 1247465"/>
+              <a:gd name="connsiteY0" fmla="*/ 1419966 h 1419966"/>
+              <a:gd name="connsiteX1" fmla="*/ 3020 w 1247465"/>
+              <a:gd name="connsiteY1" fmla="*/ 1025267 h 1419966"/>
+              <a:gd name="connsiteX2" fmla="*/ 3020 w 1247465"/>
+              <a:gd name="connsiteY2" fmla="*/ 1025266 h 1419966"/>
+              <a:gd name="connsiteX3" fmla="*/ 105948 w 1247465"/>
+              <a:gd name="connsiteY3" fmla="*/ 480121 h 1419966"/>
+              <a:gd name="connsiteX4" fmla="*/ 651094 w 1247465"/>
+              <a:gd name="connsiteY4" fmla="*/ 17154 h 1419966"/>
+              <a:gd name="connsiteX5" fmla="*/ 1177091 w 1247465"/>
+              <a:gd name="connsiteY5" fmla="*/ 377195 h 1419966"/>
+              <a:gd name="connsiteX6" fmla="*/ 1247465 w 1247465"/>
+              <a:gd name="connsiteY6" fmla="*/ 631372 h 1419966"/>
+              <a:gd name="connsiteX0" fmla="*/ 53837 w 1249100"/>
+              <a:gd name="connsiteY0" fmla="*/ 1419966 h 1419966"/>
+              <a:gd name="connsiteX1" fmla="*/ 3020 w 1249100"/>
+              <a:gd name="connsiteY1" fmla="*/ 1025267 h 1419966"/>
+              <a:gd name="connsiteX2" fmla="*/ 3020 w 1249100"/>
+              <a:gd name="connsiteY2" fmla="*/ 1025266 h 1419966"/>
+              <a:gd name="connsiteX3" fmla="*/ 105948 w 1249100"/>
+              <a:gd name="connsiteY3" fmla="*/ 480121 h 1419966"/>
+              <a:gd name="connsiteX4" fmla="*/ 651094 w 1249100"/>
+              <a:gd name="connsiteY4" fmla="*/ 17154 h 1419966"/>
+              <a:gd name="connsiteX5" fmla="*/ 1177091 w 1249100"/>
+              <a:gd name="connsiteY5" fmla="*/ 377195 h 1419966"/>
+              <a:gd name="connsiteX6" fmla="*/ 1249100 w 1249100"/>
+              <a:gd name="connsiteY6" fmla="*/ 665227 h 1419966"/>
+              <a:gd name="connsiteX0" fmla="*/ 53837 w 1249100"/>
+              <a:gd name="connsiteY0" fmla="*/ 1419966 h 1419966"/>
+              <a:gd name="connsiteX1" fmla="*/ 3020 w 1249100"/>
+              <a:gd name="connsiteY1" fmla="*/ 1025267 h 1419966"/>
+              <a:gd name="connsiteX2" fmla="*/ 3020 w 1249100"/>
+              <a:gd name="connsiteY2" fmla="*/ 1025266 h 1419966"/>
+              <a:gd name="connsiteX3" fmla="*/ 105948 w 1249100"/>
+              <a:gd name="connsiteY3" fmla="*/ 480121 h 1419966"/>
+              <a:gd name="connsiteX4" fmla="*/ 651094 w 1249100"/>
+              <a:gd name="connsiteY4" fmla="*/ 17154 h 1419966"/>
+              <a:gd name="connsiteX5" fmla="*/ 1177091 w 1249100"/>
+              <a:gd name="connsiteY5" fmla="*/ 377195 h 1419966"/>
+              <a:gd name="connsiteX6" fmla="*/ 1249100 w 1249100"/>
+              <a:gd name="connsiteY6" fmla="*/ 665227 h 1419966"/>
+              <a:gd name="connsiteX0" fmla="*/ 53837 w 1249099"/>
+              <a:gd name="connsiteY0" fmla="*/ 1419966 h 1419966"/>
+              <a:gd name="connsiteX1" fmla="*/ 3020 w 1249099"/>
+              <a:gd name="connsiteY1" fmla="*/ 1025267 h 1419966"/>
+              <a:gd name="connsiteX2" fmla="*/ 3020 w 1249099"/>
+              <a:gd name="connsiteY2" fmla="*/ 1025266 h 1419966"/>
+              <a:gd name="connsiteX3" fmla="*/ 105948 w 1249099"/>
+              <a:gd name="connsiteY3" fmla="*/ 480121 h 1419966"/>
+              <a:gd name="connsiteX4" fmla="*/ 651094 w 1249099"/>
+              <a:gd name="connsiteY4" fmla="*/ 17154 h 1419966"/>
+              <a:gd name="connsiteX5" fmla="*/ 1177091 w 1249099"/>
+              <a:gd name="connsiteY5" fmla="*/ 377195 h 1419966"/>
+              <a:gd name="connsiteX6" fmla="*/ 1249099 w 1249099"/>
+              <a:gd name="connsiteY6" fmla="*/ 665227 h 1419966"/>
+              <a:gd name="connsiteX0" fmla="*/ 53837 w 1249100"/>
+              <a:gd name="connsiteY0" fmla="*/ 1419966 h 1419966"/>
+              <a:gd name="connsiteX1" fmla="*/ 3020 w 1249100"/>
+              <a:gd name="connsiteY1" fmla="*/ 1025267 h 1419966"/>
+              <a:gd name="connsiteX2" fmla="*/ 3020 w 1249100"/>
+              <a:gd name="connsiteY2" fmla="*/ 1025266 h 1419966"/>
+              <a:gd name="connsiteX3" fmla="*/ 105948 w 1249100"/>
+              <a:gd name="connsiteY3" fmla="*/ 480121 h 1419966"/>
+              <a:gd name="connsiteX4" fmla="*/ 651094 w 1249100"/>
+              <a:gd name="connsiteY4" fmla="*/ 17154 h 1419966"/>
+              <a:gd name="connsiteX5" fmla="*/ 1177091 w 1249100"/>
+              <a:gd name="connsiteY5" fmla="*/ 377195 h 1419966"/>
+              <a:gd name="connsiteX6" fmla="*/ 1249100 w 1249100"/>
+              <a:gd name="connsiteY6" fmla="*/ 665227 h 1419966"/>
+              <a:gd name="connsiteX0" fmla="*/ 53837 w 1249099"/>
+              <a:gd name="connsiteY0" fmla="*/ 1419966 h 1419966"/>
+              <a:gd name="connsiteX1" fmla="*/ 3020 w 1249099"/>
+              <a:gd name="connsiteY1" fmla="*/ 1025267 h 1419966"/>
+              <a:gd name="connsiteX2" fmla="*/ 3020 w 1249099"/>
+              <a:gd name="connsiteY2" fmla="*/ 1025266 h 1419966"/>
+              <a:gd name="connsiteX3" fmla="*/ 105948 w 1249099"/>
+              <a:gd name="connsiteY3" fmla="*/ 480121 h 1419966"/>
+              <a:gd name="connsiteX4" fmla="*/ 651094 w 1249099"/>
+              <a:gd name="connsiteY4" fmla="*/ 17154 h 1419966"/>
+              <a:gd name="connsiteX5" fmla="*/ 1177091 w 1249099"/>
+              <a:gd name="connsiteY5" fmla="*/ 377195 h 1419966"/>
+              <a:gd name="connsiteX6" fmla="*/ 1249099 w 1249099"/>
+              <a:gd name="connsiteY6" fmla="*/ 665227 h 1419966"/>
+              <a:gd name="connsiteX0" fmla="*/ 68988 w 1246079"/>
+              <a:gd name="connsiteY0" fmla="*/ 1457315 h 1457315"/>
+              <a:gd name="connsiteX1" fmla="*/ 0 w 1246079"/>
+              <a:gd name="connsiteY1" fmla="*/ 1025267 h 1457315"/>
+              <a:gd name="connsiteX2" fmla="*/ 0 w 1246079"/>
+              <a:gd name="connsiteY2" fmla="*/ 1025266 h 1457315"/>
+              <a:gd name="connsiteX3" fmla="*/ 102928 w 1246079"/>
+              <a:gd name="connsiteY3" fmla="*/ 480121 h 1457315"/>
+              <a:gd name="connsiteX4" fmla="*/ 648074 w 1246079"/>
+              <a:gd name="connsiteY4" fmla="*/ 17154 h 1457315"/>
+              <a:gd name="connsiteX5" fmla="*/ 1174071 w 1246079"/>
+              <a:gd name="connsiteY5" fmla="*/ 377195 h 1457315"/>
+              <a:gd name="connsiteX6" fmla="*/ 1246079 w 1246079"/>
+              <a:gd name="connsiteY6" fmla="*/ 665227 h 1457315"/>
+            </a:gdLst>
+            <a:ahLst/>
+            <a:cxnLst>
+              <a:cxn ang="0">
+                <a:pos x="connsiteX0" y="connsiteY0"/>
+              </a:cxn>
+              <a:cxn ang="0">
+                <a:pos x="connsiteX1" y="connsiteY1"/>
+              </a:cxn>
+              <a:cxn ang="0">
+                <a:pos x="connsiteX2" y="connsiteY2"/>
+              </a:cxn>
+              <a:cxn ang="0">
+                <a:pos x="connsiteX3" y="connsiteY3"/>
+              </a:cxn>
+              <a:cxn ang="0">
+                <a:pos x="connsiteX4" y="connsiteY4"/>
+              </a:cxn>
+              <a:cxn ang="0">
+                <a:pos x="connsiteX5" y="connsiteY5"/>
+              </a:cxn>
+              <a:cxn ang="0">
+                <a:pos x="connsiteX6" y="connsiteY6"/>
+              </a:cxn>
+            </a:cxnLst>
+            <a:rect l="l" t="t" r="r" b="b"/>
+            <a:pathLst>
+              <a:path w="1246079" h="1457315">
+                <a:moveTo>
+                  <a:pt x="68988" y="1457315"/>
+                </a:moveTo>
+                <a:cubicBezTo>
+                  <a:pt x="15151" y="1311884"/>
+                  <a:pt x="8469" y="1091050"/>
+                  <a:pt x="0" y="1025267"/>
+                </a:cubicBezTo>
+                <a:lnTo>
+                  <a:pt x="0" y="1025266"/>
+                </a:lnTo>
+                <a:cubicBezTo>
+                  <a:pt x="0" y="831959"/>
+                  <a:pt x="35729" y="642727"/>
+                  <a:pt x="102928" y="480121"/>
+                </a:cubicBezTo>
+                <a:cubicBezTo>
+                  <a:pt x="222174" y="191576"/>
+                  <a:pt x="469550" y="34308"/>
+                  <a:pt x="648074" y="17154"/>
+                </a:cubicBezTo>
+                <a:cubicBezTo>
+                  <a:pt x="826598" y="0"/>
+                  <a:pt x="1110692" y="146175"/>
+                  <a:pt x="1174071" y="377195"/>
+                </a:cubicBezTo>
+                <a:cubicBezTo>
+                  <a:pt x="1225401" y="555068"/>
+                  <a:pt x="1223782" y="554935"/>
+                  <a:pt x="1246079" y="665227"/>
+                </a:cubicBezTo>
+              </a:path>
+            </a:pathLst>
+          </a:custGeom>
+          <a:noFill/>
+          <a:ln w="12700">
+            <a:solidFill>
+              <a:schemeClr val="tx1"/>
+            </a:solidFill>
+          </a:ln>
+        </p:spPr>
+        <p:style>
+          <a:lnRef idx="2">
+            <a:schemeClr val="accent1">
+              <a:shade val="50000"/>
+            </a:schemeClr>
+          </a:lnRef>
+          <a:fillRef idx="1">
+            <a:schemeClr val="accent1"/>
+          </a:fillRef>
+          <a:effectRef idx="0">
+            <a:schemeClr val="accent1"/>
+          </a:effectRef>
+          <a:fontRef idx="minor">
+            <a:schemeClr val="lt1"/>
+          </a:fontRef>
+        </p:style>
+        <p:txBody>
+          <a:bodyPr rtlCol="0" anchor="ctr"/>
+          <a:lstStyle/>
+          <a:p>
+            <a:pPr algn="ctr"/>
+            <a:endParaRPr lang="ru-RU"/>
+          </a:p>
+        </p:txBody>
+      </p:sp>
+      <p:sp>
+        <p:nvSpPr>
+          <p:cNvPr id="63" name="Oval 55"/>
+          <p:cNvSpPr>
+            <a:spLocks noChangeAspect="1"/>
+          </p:cNvSpPr>
+          <p:nvPr/>
+        </p:nvSpPr>
+        <p:spPr>
+          <a:xfrm>
+            <a:off x="4460288" y="3294188"/>
+            <a:ext cx="62898" cy="62906"/>
+          </a:xfrm>
+          <a:prstGeom prst="ellipse">
+            <a:avLst/>
+          </a:prstGeom>
+          <a:solidFill>
+            <a:schemeClr val="tx1"/>
+          </a:solidFill>
+          <a:ln>
+            <a:noFill/>
+          </a:ln>
+        </p:spPr>
+        <p:style>
+          <a:lnRef idx="2">
+            <a:schemeClr val="accent1">
+              <a:shade val="50000"/>
+            </a:schemeClr>
+          </a:lnRef>
+          <a:fillRef idx="1">
+            <a:schemeClr val="accent1"/>
+          </a:fillRef>
+          <a:effectRef idx="0">
+            <a:schemeClr val="accent1"/>
+          </a:effectRef>
+          <a:fontRef idx="minor">
+            <a:schemeClr val="lt1"/>
+          </a:fontRef>
+        </p:style>
+        <p:txBody>
+          <a:bodyPr rtlCol="0" anchor="ctr"/>
+          <a:lstStyle/>
+          <a:p>
+            <a:pPr algn="ctr"/>
+            <a:endParaRPr lang="ru-RU"/>
+          </a:p>
+        </p:txBody>
+      </p:sp>
+      <p:sp>
+        <p:nvSpPr>
+          <p:cNvPr id="64" name="Oval 55"/>
+          <p:cNvSpPr>
+            <a:spLocks noChangeAspect="1"/>
+          </p:cNvSpPr>
+          <p:nvPr/>
+        </p:nvSpPr>
+        <p:spPr>
+          <a:xfrm>
+            <a:off x="3275856" y="4077072"/>
+            <a:ext cx="62898" cy="62906"/>
+          </a:xfrm>
+          <a:prstGeom prst="ellipse">
+            <a:avLst/>
+          </a:prstGeom>
+          <a:solidFill>
+            <a:schemeClr val="tx1"/>
+          </a:solidFill>
+          <a:ln>
+            <a:noFill/>
+          </a:ln>
+        </p:spPr>
+        <p:style>
+          <a:lnRef idx="2">
+            <a:schemeClr val="accent1">
+              <a:shade val="50000"/>
+            </a:schemeClr>
+          </a:lnRef>
+          <a:fillRef idx="1">
+            <a:schemeClr val="accent1"/>
+          </a:fillRef>
+          <a:effectRef idx="0">
+            <a:schemeClr val="accent1"/>
+          </a:effectRef>
+          <a:fontRef idx="minor">
+            <a:schemeClr val="lt1"/>
+          </a:fontRef>
+        </p:style>
+        <p:txBody>
+          <a:bodyPr rtlCol="0" anchor="ctr"/>
+          <a:lstStyle/>
+          <a:p>
+            <a:pPr algn="ctr"/>
+            <a:endParaRPr lang="ru-RU"/>
+          </a:p>
+        </p:txBody>
+      </p:sp>
+      <p:sp>
+        <p:nvSpPr>
+          <p:cNvPr id="65" name="Oval 55"/>
+          <p:cNvSpPr>
+            <a:spLocks noChangeAspect="1"/>
+          </p:cNvSpPr>
+          <p:nvPr/>
+        </p:nvSpPr>
+        <p:spPr>
+          <a:xfrm>
+            <a:off x="3873396" y="2636912"/>
+            <a:ext cx="62898" cy="62906"/>
+          </a:xfrm>
+          <a:prstGeom prst="ellipse">
+            <a:avLst/>
+          </a:prstGeom>
+          <a:solidFill>
+            <a:schemeClr val="tx1"/>
+          </a:solidFill>
+          <a:ln>
+            <a:noFill/>
+          </a:ln>
+        </p:spPr>
+        <p:style>
+          <a:lnRef idx="2">
+            <a:schemeClr val="accent1">
+              <a:shade val="50000"/>
+            </a:schemeClr>
+          </a:lnRef>
+          <a:fillRef idx="1">
+            <a:schemeClr val="accent1"/>
+          </a:fillRef>
+          <a:effectRef idx="0">
+            <a:schemeClr val="accent1"/>
+          </a:effectRef>
+          <a:fontRef idx="minor">
+            <a:schemeClr val="lt1"/>
+          </a:fontRef>
+        </p:style>
+        <p:txBody>
+          <a:bodyPr rtlCol="0" anchor="ctr"/>
+          <a:lstStyle/>
+          <a:p>
+            <a:pPr algn="ctr"/>
+            <a:endParaRPr lang="ru-RU"/>
+          </a:p>
+        </p:txBody>
+      </p:sp>
+      <p:cxnSp>
+        <p:nvCxnSpPr>
+          <p:cNvPr id="71" name="Straight Connector 51"/>
+          <p:cNvCxnSpPr/>
+          <p:nvPr/>
+        </p:nvCxnSpPr>
+        <p:spPr>
+          <a:xfrm>
+            <a:off x="2051720" y="2157666"/>
+            <a:ext cx="0" cy="2772000"/>
+          </a:xfrm>
+          <a:prstGeom prst="line">
+            <a:avLst/>
+          </a:prstGeom>
+          <a:ln>
+            <a:solidFill>
+              <a:schemeClr val="tx1"/>
+            </a:solidFill>
+            <a:prstDash val="lgDash"/>
+          </a:ln>
+        </p:spPr>
+        <p:style>
+          <a:lnRef idx="1">
+            <a:schemeClr val="accent1"/>
+          </a:lnRef>
+          <a:fillRef idx="0">
+            <a:schemeClr val="accent1"/>
+          </a:fillRef>
+          <a:effectRef idx="0">
+            <a:schemeClr val="accent1"/>
+          </a:effectRef>
+          <a:fontRef idx="minor">
+            <a:schemeClr val="tx1"/>
+          </a:fontRef>
+        </p:style>
+      </p:cxnSp>
+      <p:cxnSp>
+        <p:nvCxnSpPr>
+          <p:cNvPr id="80" name="Прямая со стрелкой 79"/>
+          <p:cNvCxnSpPr>
+            <a:cxnSpLocks noChangeAspect="1"/>
+          </p:cNvCxnSpPr>
+          <p:nvPr/>
+        </p:nvCxnSpPr>
+        <p:spPr>
+          <a:xfrm flipH="1" flipV="1">
+            <a:off x="3313039" y="3215980"/>
+            <a:ext cx="582568" cy="492535"/>
+          </a:xfrm>
+          <a:prstGeom prst="straightConnector1">
+            <a:avLst/>
+          </a:prstGeom>
+          <a:ln w="12700">
+            <a:solidFill>
+              <a:schemeClr val="tx1"/>
+            </a:solidFill>
+            <a:tailEnd type="stealth" w="med" len="lg"/>
+          </a:ln>
+        </p:spPr>
+        <p:style>
+          <a:lnRef idx="1">
+            <a:schemeClr val="accent1"/>
+          </a:lnRef>
+          <a:fillRef idx="0">
+            <a:schemeClr val="accent1"/>
+          </a:fillRef>
+          <a:effectRef idx="0">
+            <a:schemeClr val="accent1"/>
+          </a:effectRef>
+          <a:fontRef idx="minor">
+            <a:schemeClr val="tx1"/>
+          </a:fontRef>
+        </p:style>
+      </p:cxnSp>
+      <p:sp>
+        <p:nvSpPr>
+          <p:cNvPr id="82" name="Freeform 68"/>
+          <p:cNvSpPr/>
+          <p:nvPr/>
+        </p:nvSpPr>
+        <p:spPr>
+          <a:xfrm rot="11238943">
+            <a:off x="3549091" y="3494360"/>
+            <a:ext cx="70624" cy="422482"/>
+          </a:xfrm>
+          <a:custGeom>
+            <a:avLst/>
+            <a:gdLst>
+              <a:gd name="connsiteX0" fmla="*/ 0 w 139118"/>
+              <a:gd name="connsiteY0" fmla="*/ 0 h 428878"/>
+              <a:gd name="connsiteX1" fmla="*/ 89013 w 139118"/>
+              <a:gd name="connsiteY1" fmla="*/ 89013 h 428878"/>
+              <a:gd name="connsiteX2" fmla="*/ 137565 w 139118"/>
+              <a:gd name="connsiteY2" fmla="*/ 210393 h 428878"/>
+              <a:gd name="connsiteX3" fmla="*/ 121381 w 139118"/>
+              <a:gd name="connsiteY3" fmla="*/ 339866 h 428878"/>
+              <a:gd name="connsiteX4" fmla="*/ 64736 w 139118"/>
+              <a:gd name="connsiteY4" fmla="*/ 428878 h 428878"/>
+            </a:gdLst>
+            <a:ahLst/>
+            <a:cxnLst>
+              <a:cxn ang="0">
+                <a:pos x="connsiteX0" y="connsiteY0"/>
+              </a:cxn>
+              <a:cxn ang="0">
+                <a:pos x="connsiteX1" y="connsiteY1"/>
+              </a:cxn>
+              <a:cxn ang="0">
+                <a:pos x="connsiteX2" y="connsiteY2"/>
+              </a:cxn>
+              <a:cxn ang="0">
+                <a:pos x="connsiteX3" y="connsiteY3"/>
+              </a:cxn>
+              <a:cxn ang="0">
+                <a:pos x="connsiteX4" y="connsiteY4"/>
+              </a:cxn>
+            </a:cxnLst>
+            <a:rect l="l" t="t" r="r" b="b"/>
+            <a:pathLst>
+              <a:path w="139118" h="428878">
+                <a:moveTo>
+                  <a:pt x="0" y="0"/>
+                </a:moveTo>
+                <a:cubicBezTo>
+                  <a:pt x="33043" y="26974"/>
+                  <a:pt x="66086" y="53948"/>
+                  <a:pt x="89013" y="89013"/>
+                </a:cubicBezTo>
+                <a:cubicBezTo>
+                  <a:pt x="111940" y="124078"/>
+                  <a:pt x="132170" y="168584"/>
+                  <a:pt x="137565" y="210393"/>
+                </a:cubicBezTo>
+                <a:cubicBezTo>
+                  <a:pt x="142960" y="252202"/>
+                  <a:pt x="133519" y="303452"/>
+                  <a:pt x="121381" y="339866"/>
+                </a:cubicBezTo>
+                <a:cubicBezTo>
+                  <a:pt x="109243" y="376280"/>
+                  <a:pt x="86989" y="402579"/>
+                  <a:pt x="64736" y="428878"/>
+                </a:cubicBezTo>
+              </a:path>
+            </a:pathLst>
+          </a:custGeom>
+          <a:noFill/>
+          <a:ln w="25400">
+            <a:solidFill>
+              <a:schemeClr val="tx1"/>
+            </a:solidFill>
+            <a:prstDash val="dash"/>
+          </a:ln>
+        </p:spPr>
+        <p:style>
+          <a:lnRef idx="2">
+            <a:schemeClr val="accent1">
+              <a:shade val="50000"/>
+            </a:schemeClr>
+          </a:lnRef>
+          <a:fillRef idx="1">
+            <a:schemeClr val="accent1"/>
+          </a:fillRef>
+          <a:effectRef idx="0">
+            <a:schemeClr val="accent1"/>
+          </a:effectRef>
+          <a:fontRef idx="minor">
+            <a:schemeClr val="lt1"/>
+          </a:fontRef>
+        </p:style>
+        <p:txBody>
+          <a:bodyPr rtlCol="0" anchor="ctr"/>
+          <a:lstStyle/>
+          <a:p>
+            <a:pPr algn="ctr"/>
+            <a:endParaRPr lang="ru-RU"/>
+          </a:p>
+        </p:txBody>
+      </p:sp>
+      <p:sp>
+        <p:nvSpPr>
+          <p:cNvPr id="83" name="Freeform 68"/>
+          <p:cNvSpPr/>
+          <p:nvPr/>
+        </p:nvSpPr>
+        <p:spPr>
+          <a:xfrm rot="18540000">
+            <a:off x="4004790" y="3084268"/>
+            <a:ext cx="58141" cy="268838"/>
+          </a:xfrm>
+          <a:custGeom>
+            <a:avLst/>
+            <a:gdLst>
+              <a:gd name="connsiteX0" fmla="*/ 0 w 139118"/>
+              <a:gd name="connsiteY0" fmla="*/ 0 h 428878"/>
+              <a:gd name="connsiteX1" fmla="*/ 89013 w 139118"/>
+              <a:gd name="connsiteY1" fmla="*/ 89013 h 428878"/>
+              <a:gd name="connsiteX2" fmla="*/ 137565 w 139118"/>
+              <a:gd name="connsiteY2" fmla="*/ 210393 h 428878"/>
+              <a:gd name="connsiteX3" fmla="*/ 121381 w 139118"/>
+              <a:gd name="connsiteY3" fmla="*/ 339866 h 428878"/>
+              <a:gd name="connsiteX4" fmla="*/ 64736 w 139118"/>
+              <a:gd name="connsiteY4" fmla="*/ 428878 h 428878"/>
+            </a:gdLst>
+            <a:ahLst/>
+            <a:cxnLst>
+              <a:cxn ang="0">
+                <a:pos x="connsiteX0" y="connsiteY0"/>
+              </a:cxn>
+              <a:cxn ang="0">
+                <a:pos x="connsiteX1" y="connsiteY1"/>
+              </a:cxn>
+              <a:cxn ang="0">
+                <a:pos x="connsiteX2" y="connsiteY2"/>
+              </a:cxn>
+              <a:cxn ang="0">
+                <a:pos x="connsiteX3" y="connsiteY3"/>
+              </a:cxn>
+              <a:cxn ang="0">
+                <a:pos x="connsiteX4" y="connsiteY4"/>
+              </a:cxn>
+            </a:cxnLst>
+            <a:rect l="l" t="t" r="r" b="b"/>
+            <a:pathLst>
+              <a:path w="139118" h="428878">
+                <a:moveTo>
+                  <a:pt x="0" y="0"/>
+                </a:moveTo>
+                <a:cubicBezTo>
+                  <a:pt x="33043" y="26974"/>
+                  <a:pt x="66086" y="53948"/>
+                  <a:pt x="89013" y="89013"/>
+                </a:cubicBezTo>
+                <a:cubicBezTo>
+                  <a:pt x="111940" y="124078"/>
+                  <a:pt x="132170" y="168584"/>
+                  <a:pt x="137565" y="210393"/>
+                </a:cubicBezTo>
+                <a:cubicBezTo>
+                  <a:pt x="142960" y="252202"/>
+                  <a:pt x="133519" y="303452"/>
+                  <a:pt x="121381" y="339866"/>
+                </a:cubicBezTo>
+                <a:cubicBezTo>
+                  <a:pt x="109243" y="376280"/>
+                  <a:pt x="86989" y="402579"/>
+                  <a:pt x="64736" y="428878"/>
+                </a:cubicBezTo>
+              </a:path>
+            </a:pathLst>
+          </a:custGeom>
+          <a:noFill/>
+          <a:ln w="25400">
+            <a:solidFill>
+              <a:schemeClr val="tx1"/>
+            </a:solidFill>
+            <a:prstDash val="dash"/>
+          </a:ln>
+        </p:spPr>
+        <p:style>
+          <a:lnRef idx="2">
+            <a:schemeClr val="accent1">
+              <a:shade val="50000"/>
+            </a:schemeClr>
+          </a:lnRef>
+          <a:fillRef idx="1">
+            <a:schemeClr val="accent1"/>
+          </a:fillRef>
+          <a:effectRef idx="0">
+            <a:schemeClr val="accent1"/>
+          </a:effectRef>
+          <a:fontRef idx="minor">
+            <a:schemeClr val="lt1"/>
+          </a:fontRef>
+        </p:style>
+        <p:txBody>
+          <a:bodyPr rtlCol="0" anchor="ctr"/>
+          <a:lstStyle/>
+          <a:p>
+            <a:pPr algn="ctr"/>
+            <a:endParaRPr lang="ru-RU"/>
+          </a:p>
+        </p:txBody>
+      </p:sp>
+      <p:sp>
+        <p:nvSpPr>
+          <p:cNvPr id="84" name="TextBox 83"/>
+          <p:cNvSpPr txBox="1"/>
+          <p:nvPr/>
+        </p:nvSpPr>
+        <p:spPr>
+          <a:xfrm>
+            <a:off x="2987824" y="3140968"/>
+            <a:ext cx="348172" cy="369332"/>
+          </a:xfrm>
+          <a:prstGeom prst="rect">
+            <a:avLst/>
+          </a:prstGeom>
+          <a:noFill/>
+        </p:spPr>
+        <p:txBody>
+          <a:bodyPr wrap="none" rtlCol="0">
+            <a:spAutoFit/>
+          </a:bodyPr>
+          <a:lstStyle/>
+          <a:p>
+            <a:r>
+              <a:rPr lang="en-US" dirty="0" smtClean="0">
+                <a:latin typeface="Cambria Math" pitchFamily="18" charset="0"/>
+                <a:ea typeface="Cambria Math" pitchFamily="18" charset="0"/>
+              </a:rPr>
+              <a:t>x’</a:t>
+            </a:r>
+            <a:endParaRPr lang="ru-RU" dirty="0">
+              <a:latin typeface="Cambria Math" pitchFamily="18" charset="0"/>
+              <a:ea typeface="Cambria Math" pitchFamily="18" charset="0"/>
+            </a:endParaRPr>
+          </a:p>
+        </p:txBody>
+      </p:sp>
+      <p:sp>
+        <p:nvSpPr>
+          <p:cNvPr id="85" name="TextBox 84"/>
+          <p:cNvSpPr txBox="1"/>
+          <p:nvPr/>
+        </p:nvSpPr>
+        <p:spPr>
+          <a:xfrm>
+            <a:off x="4283968" y="2564904"/>
+            <a:ext cx="340158" cy="369332"/>
+          </a:xfrm>
+          <a:prstGeom prst="rect">
+            <a:avLst/>
+          </a:prstGeom>
+          <a:noFill/>
+        </p:spPr>
+        <p:txBody>
+          <a:bodyPr wrap="none" rtlCol="0">
+            <a:spAutoFit/>
+          </a:bodyPr>
+          <a:lstStyle/>
+          <a:p>
+            <a:r>
+              <a:rPr lang="en-US" dirty="0" smtClean="0">
+                <a:latin typeface="Cambria Math" pitchFamily="18" charset="0"/>
+                <a:ea typeface="Cambria Math" pitchFamily="18" charset="0"/>
+              </a:rPr>
+              <a:t>z’</a:t>
+            </a:r>
+            <a:endParaRPr lang="ru-RU" dirty="0">
+              <a:latin typeface="Cambria Math" pitchFamily="18" charset="0"/>
+              <a:ea typeface="Cambria Math" pitchFamily="18" charset="0"/>
+            </a:endParaRPr>
+          </a:p>
+        </p:txBody>
+      </p:sp>
+      <p:sp>
+        <p:nvSpPr>
+          <p:cNvPr id="37" name="Freeform 68"/>
+          <p:cNvSpPr/>
+          <p:nvPr/>
+        </p:nvSpPr>
+        <p:spPr>
+          <a:xfrm rot="20526839">
+            <a:off x="4345242" y="3329714"/>
+            <a:ext cx="75202" cy="399353"/>
+          </a:xfrm>
+          <a:custGeom>
+            <a:avLst/>
+            <a:gdLst>
+              <a:gd name="connsiteX0" fmla="*/ 0 w 139118"/>
+              <a:gd name="connsiteY0" fmla="*/ 0 h 428878"/>
+              <a:gd name="connsiteX1" fmla="*/ 89013 w 139118"/>
+              <a:gd name="connsiteY1" fmla="*/ 89013 h 428878"/>
+              <a:gd name="connsiteX2" fmla="*/ 137565 w 139118"/>
+              <a:gd name="connsiteY2" fmla="*/ 210393 h 428878"/>
+              <a:gd name="connsiteX3" fmla="*/ 121381 w 139118"/>
+              <a:gd name="connsiteY3" fmla="*/ 339866 h 428878"/>
+              <a:gd name="connsiteX4" fmla="*/ 64736 w 139118"/>
+              <a:gd name="connsiteY4" fmla="*/ 428878 h 428878"/>
+            </a:gdLst>
+            <a:ahLst/>
+            <a:cxnLst>
+              <a:cxn ang="0">
+                <a:pos x="connsiteX0" y="connsiteY0"/>
+              </a:cxn>
+              <a:cxn ang="0">
+                <a:pos x="connsiteX1" y="connsiteY1"/>
+              </a:cxn>
+              <a:cxn ang="0">
+                <a:pos x="connsiteX2" y="connsiteY2"/>
+              </a:cxn>
+              <a:cxn ang="0">
+                <a:pos x="connsiteX3" y="connsiteY3"/>
+              </a:cxn>
+              <a:cxn ang="0">
+                <a:pos x="connsiteX4" y="connsiteY4"/>
+              </a:cxn>
+            </a:cxnLst>
+            <a:rect l="l" t="t" r="r" b="b"/>
+            <a:pathLst>
+              <a:path w="139118" h="428878">
+                <a:moveTo>
+                  <a:pt x="0" y="0"/>
+                </a:moveTo>
+                <a:cubicBezTo>
+                  <a:pt x="33043" y="26974"/>
+                  <a:pt x="66086" y="53948"/>
+                  <a:pt x="89013" y="89013"/>
+                </a:cubicBezTo>
+                <a:cubicBezTo>
+                  <a:pt x="111940" y="124078"/>
+                  <a:pt x="132170" y="168584"/>
+                  <a:pt x="137565" y="210393"/>
+                </a:cubicBezTo>
+                <a:cubicBezTo>
+                  <a:pt x="142960" y="252202"/>
+                  <a:pt x="133519" y="303452"/>
+                  <a:pt x="121381" y="339866"/>
+                </a:cubicBezTo>
+                <a:cubicBezTo>
+                  <a:pt x="109243" y="376280"/>
+                  <a:pt x="86989" y="402579"/>
+                  <a:pt x="64736" y="428878"/>
+                </a:cubicBezTo>
+              </a:path>
+            </a:pathLst>
+          </a:custGeom>
+          <a:noFill/>
+          <a:ln w="31750">
+            <a:solidFill>
+              <a:schemeClr val="tx1"/>
+            </a:solidFill>
+            <a:prstDash val="sysDot"/>
+          </a:ln>
+        </p:spPr>
+        <p:style>
+          <a:lnRef idx="2">
+            <a:schemeClr val="accent1">
+              <a:shade val="50000"/>
+            </a:schemeClr>
+          </a:lnRef>
+          <a:fillRef idx="1">
+            <a:schemeClr val="accent1"/>
+          </a:fillRef>
+          <a:effectRef idx="0">
+            <a:schemeClr val="accent1"/>
+          </a:effectRef>
+          <a:fontRef idx="minor">
+            <a:schemeClr val="lt1"/>
+          </a:fontRef>
+        </p:style>
+        <p:txBody>
+          <a:bodyPr rtlCol="0" anchor="ctr"/>
+          <a:lstStyle/>
+          <a:p>
+            <a:pPr algn="ctr"/>
+            <a:endParaRPr lang="ru-RU"/>
+          </a:p>
+        </p:txBody>
+      </p:sp>
+      <p:sp>
+        <p:nvSpPr>
+          <p:cNvPr id="38" name="TextBox 37"/>
+          <p:cNvSpPr txBox="1"/>
+          <p:nvPr/>
+        </p:nvSpPr>
+        <p:spPr>
+          <a:xfrm>
+            <a:off x="4384248" y="3273496"/>
+            <a:ext cx="312906" cy="369332"/>
+          </a:xfrm>
+          <a:prstGeom prst="rect">
+            <a:avLst/>
+          </a:prstGeom>
+          <a:noFill/>
+        </p:spPr>
+        <p:txBody>
+          <a:bodyPr wrap="none" rtlCol="0">
+            <a:spAutoFit/>
+          </a:bodyPr>
+          <a:lstStyle/>
+          <a:p>
+            <a:r>
+              <a:rPr lang="el-GR" dirty="0" smtClean="0">
+                <a:latin typeface="Cambria Math"/>
+                <a:ea typeface="Cambria Math"/>
+              </a:rPr>
+              <a:t>β</a:t>
+            </a:r>
+            <a:endParaRPr lang="ru-RU" dirty="0"/>
+          </a:p>
+        </p:txBody>
+      </p:sp>
+    </p:spTree>
   </p:cSld>
   <p:clrMapOvr>
     <a:masterClrMapping/>
@@ -6301,7 +8788,26 @@
       </a:bgFillStyleLst>
     </a:fmtScheme>
   </a:themeElements>
-  <a:objectDefaults/>
+  <a:objectDefaults>
+    <a:txDef>
+      <a:spPr>
+        <a:blipFill rotWithShape="1">
+          <a:blip xmlns:r="http://schemas.openxmlformats.org/officeDocument/2006/relationships" r:embed="rId1" cstate="print"/>
+          <a:stretch>
+            <a:fillRect/>
+          </a:stretch>
+        </a:blipFill>
+      </a:spPr>
+      <a:bodyPr/>
+      <a:lstStyle>
+        <a:defPPr>
+          <a:defRPr>
+            <a:noFill/>
+          </a:defRPr>
+        </a:defPPr>
+      </a:lstStyle>
+    </a:txDef>
+  </a:objectDefaults>
   <a:extraClrSchemeLst/>
 </a:theme>
 </file>
</xml_diff>

<commit_message>
More text to text God
Signed-off-by: Anton Kutlin <anton.kutlin@gmail.com>
</commit_message>
<xml_diff>
--- a/images/images.pptx
+++ b/images/images.pptx
@@ -8,6 +8,9 @@
     <p:sldId id="256" r:id="rId2"/>
     <p:sldId id="257" r:id="rId3"/>
     <p:sldId id="258" r:id="rId4"/>
+    <p:sldId id="259" r:id="rId5"/>
+    <p:sldId id="260" r:id="rId6"/>
+    <p:sldId id="261" r:id="rId7"/>
   </p:sldIdLst>
   <p:sldSz cx="9144000" cy="6858000" type="screen4x3"/>
   <p:notesSz cx="6858000" cy="9144000"/>
@@ -291,7 +294,7 @@
             <a:fld id="{75887C6C-CE15-4571-82F3-1AB9859FC7F9}" type="datetimeFigureOut">
               <a:rPr lang="ru-RU" smtClean="0"/>
               <a:pPr/>
-              <a:t>08.06.2016</a:t>
+              <a:t>15.06.2016</a:t>
             </a:fld>
             <a:endParaRPr lang="ru-RU"/>
           </a:p>
@@ -343,7 +346,7 @@
     </p:spTree>
     <p:extLst>
       <p:ext uri="{BB962C8B-B14F-4D97-AF65-F5344CB8AC3E}">
-        <p14:creationId xmlns:p14="http://schemas.microsoft.com/office/powerpoint/2010/main" xmlns="" val="2425770089"/>
+        <p14:creationId xmlns:p14="http://schemas.microsoft.com/office/powerpoint/2010/main" val="2425770089"/>
       </p:ext>
     </p:extLst>
   </p:cSld>
@@ -463,7 +466,7 @@
             <a:fld id="{75887C6C-CE15-4571-82F3-1AB9859FC7F9}" type="datetimeFigureOut">
               <a:rPr lang="ru-RU" smtClean="0"/>
               <a:pPr/>
-              <a:t>08.06.2016</a:t>
+              <a:t>15.06.2016</a:t>
             </a:fld>
             <a:endParaRPr lang="ru-RU"/>
           </a:p>
@@ -515,7 +518,7 @@
     </p:spTree>
     <p:extLst>
       <p:ext uri="{BB962C8B-B14F-4D97-AF65-F5344CB8AC3E}">
-        <p14:creationId xmlns:p14="http://schemas.microsoft.com/office/powerpoint/2010/main" xmlns="" val="4199739221"/>
+        <p14:creationId xmlns:p14="http://schemas.microsoft.com/office/powerpoint/2010/main" val="4199739221"/>
       </p:ext>
     </p:extLst>
   </p:cSld>
@@ -645,7 +648,7 @@
             <a:fld id="{75887C6C-CE15-4571-82F3-1AB9859FC7F9}" type="datetimeFigureOut">
               <a:rPr lang="ru-RU" smtClean="0"/>
               <a:pPr/>
-              <a:t>08.06.2016</a:t>
+              <a:t>15.06.2016</a:t>
             </a:fld>
             <a:endParaRPr lang="ru-RU"/>
           </a:p>
@@ -697,7 +700,7 @@
     </p:spTree>
     <p:extLst>
       <p:ext uri="{BB962C8B-B14F-4D97-AF65-F5344CB8AC3E}">
-        <p14:creationId xmlns:p14="http://schemas.microsoft.com/office/powerpoint/2010/main" xmlns="" val="4205790879"/>
+        <p14:creationId xmlns:p14="http://schemas.microsoft.com/office/powerpoint/2010/main" val="4205790879"/>
       </p:ext>
     </p:extLst>
   </p:cSld>
@@ -817,7 +820,7 @@
             <a:fld id="{75887C6C-CE15-4571-82F3-1AB9859FC7F9}" type="datetimeFigureOut">
               <a:rPr lang="ru-RU" smtClean="0"/>
               <a:pPr/>
-              <a:t>08.06.2016</a:t>
+              <a:t>15.06.2016</a:t>
             </a:fld>
             <a:endParaRPr lang="ru-RU"/>
           </a:p>
@@ -869,7 +872,7 @@
     </p:spTree>
     <p:extLst>
       <p:ext uri="{BB962C8B-B14F-4D97-AF65-F5344CB8AC3E}">
-        <p14:creationId xmlns:p14="http://schemas.microsoft.com/office/powerpoint/2010/main" xmlns="" val="736635437"/>
+        <p14:creationId xmlns:p14="http://schemas.microsoft.com/office/powerpoint/2010/main" val="736635437"/>
       </p:ext>
     </p:extLst>
   </p:cSld>
@@ -1065,7 +1068,7 @@
             <a:fld id="{75887C6C-CE15-4571-82F3-1AB9859FC7F9}" type="datetimeFigureOut">
               <a:rPr lang="ru-RU" smtClean="0"/>
               <a:pPr/>
-              <a:t>08.06.2016</a:t>
+              <a:t>15.06.2016</a:t>
             </a:fld>
             <a:endParaRPr lang="ru-RU"/>
           </a:p>
@@ -1117,7 +1120,7 @@
     </p:spTree>
     <p:extLst>
       <p:ext uri="{BB962C8B-B14F-4D97-AF65-F5344CB8AC3E}">
-        <p14:creationId xmlns:p14="http://schemas.microsoft.com/office/powerpoint/2010/main" xmlns="" val="985891967"/>
+        <p14:creationId xmlns:p14="http://schemas.microsoft.com/office/powerpoint/2010/main" val="985891967"/>
       </p:ext>
     </p:extLst>
   </p:cSld>
@@ -1355,7 +1358,7 @@
             <a:fld id="{75887C6C-CE15-4571-82F3-1AB9859FC7F9}" type="datetimeFigureOut">
               <a:rPr lang="ru-RU" smtClean="0"/>
               <a:pPr/>
-              <a:t>08.06.2016</a:t>
+              <a:t>15.06.2016</a:t>
             </a:fld>
             <a:endParaRPr lang="ru-RU"/>
           </a:p>
@@ -1407,7 +1410,7 @@
     </p:spTree>
     <p:extLst>
       <p:ext uri="{BB962C8B-B14F-4D97-AF65-F5344CB8AC3E}">
-        <p14:creationId xmlns:p14="http://schemas.microsoft.com/office/powerpoint/2010/main" xmlns="" val="3227159121"/>
+        <p14:creationId xmlns:p14="http://schemas.microsoft.com/office/powerpoint/2010/main" val="3227159121"/>
       </p:ext>
     </p:extLst>
   </p:cSld>
@@ -1779,7 +1782,7 @@
             <a:fld id="{75887C6C-CE15-4571-82F3-1AB9859FC7F9}" type="datetimeFigureOut">
               <a:rPr lang="ru-RU" smtClean="0"/>
               <a:pPr/>
-              <a:t>08.06.2016</a:t>
+              <a:t>15.06.2016</a:t>
             </a:fld>
             <a:endParaRPr lang="ru-RU"/>
           </a:p>
@@ -1831,7 +1834,7 @@
     </p:spTree>
     <p:extLst>
       <p:ext uri="{BB962C8B-B14F-4D97-AF65-F5344CB8AC3E}">
-        <p14:creationId xmlns:p14="http://schemas.microsoft.com/office/powerpoint/2010/main" xmlns="" val="656661593"/>
+        <p14:creationId xmlns:p14="http://schemas.microsoft.com/office/powerpoint/2010/main" val="656661593"/>
       </p:ext>
     </p:extLst>
   </p:cSld>
@@ -1899,7 +1902,7 @@
             <a:fld id="{75887C6C-CE15-4571-82F3-1AB9859FC7F9}" type="datetimeFigureOut">
               <a:rPr lang="ru-RU" smtClean="0"/>
               <a:pPr/>
-              <a:t>08.06.2016</a:t>
+              <a:t>15.06.2016</a:t>
             </a:fld>
             <a:endParaRPr lang="ru-RU"/>
           </a:p>
@@ -1951,7 +1954,7 @@
     </p:spTree>
     <p:extLst>
       <p:ext uri="{BB962C8B-B14F-4D97-AF65-F5344CB8AC3E}">
-        <p14:creationId xmlns:p14="http://schemas.microsoft.com/office/powerpoint/2010/main" xmlns="" val="2846259462"/>
+        <p14:creationId xmlns:p14="http://schemas.microsoft.com/office/powerpoint/2010/main" val="2846259462"/>
       </p:ext>
     </p:extLst>
   </p:cSld>
@@ -1996,7 +1999,7 @@
             <a:fld id="{75887C6C-CE15-4571-82F3-1AB9859FC7F9}" type="datetimeFigureOut">
               <a:rPr lang="ru-RU" smtClean="0"/>
               <a:pPr/>
-              <a:t>08.06.2016</a:t>
+              <a:t>15.06.2016</a:t>
             </a:fld>
             <a:endParaRPr lang="ru-RU"/>
           </a:p>
@@ -2048,7 +2051,7 @@
     </p:spTree>
     <p:extLst>
       <p:ext uri="{BB962C8B-B14F-4D97-AF65-F5344CB8AC3E}">
-        <p14:creationId xmlns:p14="http://schemas.microsoft.com/office/powerpoint/2010/main" xmlns="" val="122603745"/>
+        <p14:creationId xmlns:p14="http://schemas.microsoft.com/office/powerpoint/2010/main" val="122603745"/>
       </p:ext>
     </p:extLst>
   </p:cSld>
@@ -2275,7 +2278,7 @@
             <a:fld id="{75887C6C-CE15-4571-82F3-1AB9859FC7F9}" type="datetimeFigureOut">
               <a:rPr lang="ru-RU" smtClean="0"/>
               <a:pPr/>
-              <a:t>08.06.2016</a:t>
+              <a:t>15.06.2016</a:t>
             </a:fld>
             <a:endParaRPr lang="ru-RU"/>
           </a:p>
@@ -2327,7 +2330,7 @@
     </p:spTree>
     <p:extLst>
       <p:ext uri="{BB962C8B-B14F-4D97-AF65-F5344CB8AC3E}">
-        <p14:creationId xmlns:p14="http://schemas.microsoft.com/office/powerpoint/2010/main" xmlns="" val="1201971040"/>
+        <p14:creationId xmlns:p14="http://schemas.microsoft.com/office/powerpoint/2010/main" val="1201971040"/>
       </p:ext>
     </p:extLst>
   </p:cSld>
@@ -2530,7 +2533,7 @@
             <a:fld id="{75887C6C-CE15-4571-82F3-1AB9859FC7F9}" type="datetimeFigureOut">
               <a:rPr lang="ru-RU" smtClean="0"/>
               <a:pPr/>
-              <a:t>08.06.2016</a:t>
+              <a:t>15.06.2016</a:t>
             </a:fld>
             <a:endParaRPr lang="ru-RU"/>
           </a:p>
@@ -2582,7 +2585,7 @@
     </p:spTree>
     <p:extLst>
       <p:ext uri="{BB962C8B-B14F-4D97-AF65-F5344CB8AC3E}">
-        <p14:creationId xmlns:p14="http://schemas.microsoft.com/office/powerpoint/2010/main" xmlns="" val="3059301482"/>
+        <p14:creationId xmlns:p14="http://schemas.microsoft.com/office/powerpoint/2010/main" val="3059301482"/>
       </p:ext>
     </p:extLst>
   </p:cSld>
@@ -2745,7 +2748,7 @@
             <a:fld id="{75887C6C-CE15-4571-82F3-1AB9859FC7F9}" type="datetimeFigureOut">
               <a:rPr lang="ru-RU" smtClean="0"/>
               <a:pPr/>
-              <a:t>08.06.2016</a:t>
+              <a:t>15.06.2016</a:t>
             </a:fld>
             <a:endParaRPr lang="ru-RU"/>
           </a:p>
@@ -2833,7 +2836,7 @@
     </p:spTree>
     <p:extLst>
       <p:ext uri="{BB962C8B-B14F-4D97-AF65-F5344CB8AC3E}">
-        <p14:creationId xmlns:p14="http://schemas.microsoft.com/office/powerpoint/2010/main" xmlns="" val="3784002488"/>
+        <p14:creationId xmlns:p14="http://schemas.microsoft.com/office/powerpoint/2010/main" val="3784002488"/>
       </p:ext>
     </p:extLst>
   </p:cSld>
@@ -3930,7 +3933,7 @@
     </p:spTree>
     <p:extLst>
       <p:ext uri="{BB962C8B-B14F-4D97-AF65-F5344CB8AC3E}">
-        <p14:creationId xmlns:p14="http://schemas.microsoft.com/office/powerpoint/2010/main" xmlns="" val="916582857"/>
+        <p14:creationId xmlns:p14="http://schemas.microsoft.com/office/powerpoint/2010/main" val="916582857"/>
       </p:ext>
     </p:extLst>
   </p:cSld>
@@ -6060,7 +6063,7 @@
     </p:spTree>
     <p:extLst>
       <p:ext uri="{BB962C8B-B14F-4D97-AF65-F5344CB8AC3E}">
-        <p14:creationId xmlns:p14="http://schemas.microsoft.com/office/powerpoint/2010/main" xmlns="" val="732466476"/>
+        <p14:creationId xmlns:p14="http://schemas.microsoft.com/office/powerpoint/2010/main" val="732466476"/>
       </p:ext>
     </p:extLst>
   </p:cSld>
@@ -8508,6 +8511,1673 @@
 </p:sld>
 </file>
 
+<file path=ppt/slides/slide4.xml><?xml version="1.0" encoding="utf-8"?>
+<p:sld xmlns:a="http://schemas.openxmlformats.org/drawingml/2006/main" xmlns:r="http://schemas.openxmlformats.org/officeDocument/2006/relationships" xmlns:p="http://schemas.openxmlformats.org/presentationml/2006/main">
+  <p:cSld>
+    <p:spTree>
+      <p:nvGrpSpPr>
+        <p:cNvPr id="1" name=""/>
+        <p:cNvGrpSpPr/>
+        <p:nvPr/>
+      </p:nvGrpSpPr>
+      <p:grpSpPr>
+        <a:xfrm>
+          <a:off x="0" y="0"/>
+          <a:ext cx="0" cy="0"/>
+          <a:chOff x="0" y="0"/>
+          <a:chExt cx="0" cy="0"/>
+        </a:xfrm>
+      </p:grpSpPr>
+      <p:cxnSp>
+        <p:nvCxnSpPr>
+          <p:cNvPr id="5" name="Straight Connector 4"/>
+          <p:cNvCxnSpPr/>
+          <p:nvPr/>
+        </p:nvCxnSpPr>
+        <p:spPr>
+          <a:xfrm>
+            <a:off x="1979712" y="3356992"/>
+            <a:ext cx="2160240" cy="0"/>
+          </a:xfrm>
+          <a:prstGeom prst="line">
+            <a:avLst/>
+          </a:prstGeom>
+          <a:ln w="25400">
+            <a:solidFill>
+              <a:schemeClr val="tx1"/>
+            </a:solidFill>
+          </a:ln>
+        </p:spPr>
+        <p:style>
+          <a:lnRef idx="1">
+            <a:schemeClr val="accent1"/>
+          </a:lnRef>
+          <a:fillRef idx="0">
+            <a:schemeClr val="accent1"/>
+          </a:fillRef>
+          <a:effectRef idx="0">
+            <a:schemeClr val="accent1"/>
+          </a:effectRef>
+          <a:fontRef idx="minor">
+            <a:schemeClr val="tx1"/>
+          </a:fontRef>
+        </p:style>
+      </p:cxnSp>
+      <p:cxnSp>
+        <p:nvCxnSpPr>
+          <p:cNvPr id="7" name="Straight Connector 6"/>
+          <p:cNvCxnSpPr/>
+          <p:nvPr/>
+        </p:nvCxnSpPr>
+        <p:spPr>
+          <a:xfrm rot="7200000">
+            <a:off x="3599893" y="2421580"/>
+            <a:ext cx="2160240" cy="0"/>
+          </a:xfrm>
+          <a:prstGeom prst="line">
+            <a:avLst/>
+          </a:prstGeom>
+          <a:ln w="25400">
+            <a:solidFill>
+              <a:schemeClr val="tx1"/>
+            </a:solidFill>
+          </a:ln>
+        </p:spPr>
+        <p:style>
+          <a:lnRef idx="1">
+            <a:schemeClr val="accent1"/>
+          </a:lnRef>
+          <a:fillRef idx="0">
+            <a:schemeClr val="accent1"/>
+          </a:fillRef>
+          <a:effectRef idx="0">
+            <a:schemeClr val="accent1"/>
+          </a:effectRef>
+          <a:fontRef idx="minor">
+            <a:schemeClr val="tx1"/>
+          </a:fontRef>
+        </p:style>
+      </p:cxnSp>
+      <p:cxnSp>
+        <p:nvCxnSpPr>
+          <p:cNvPr id="8" name="Straight Connector 7"/>
+          <p:cNvCxnSpPr/>
+          <p:nvPr/>
+        </p:nvCxnSpPr>
+        <p:spPr>
+          <a:xfrm rot="-7200000">
+            <a:off x="3599892" y="4292403"/>
+            <a:ext cx="2160240" cy="0"/>
+          </a:xfrm>
+          <a:prstGeom prst="line">
+            <a:avLst/>
+          </a:prstGeom>
+          <a:ln w="25400">
+            <a:solidFill>
+              <a:schemeClr val="tx1"/>
+            </a:solidFill>
+          </a:ln>
+        </p:spPr>
+        <p:style>
+          <a:lnRef idx="1">
+            <a:schemeClr val="accent1"/>
+          </a:lnRef>
+          <a:fillRef idx="0">
+            <a:schemeClr val="accent1"/>
+          </a:fillRef>
+          <a:effectRef idx="0">
+            <a:schemeClr val="accent1"/>
+          </a:effectRef>
+          <a:fontRef idx="minor">
+            <a:schemeClr val="tx1"/>
+          </a:fontRef>
+        </p:style>
+      </p:cxnSp>
+      <p:cxnSp>
+        <p:nvCxnSpPr>
+          <p:cNvPr id="9" name="Straight Connector 8"/>
+          <p:cNvCxnSpPr/>
+          <p:nvPr/>
+        </p:nvCxnSpPr>
+        <p:spPr>
+          <a:xfrm rot="18008984">
+            <a:off x="2517569" y="4290456"/>
+            <a:ext cx="2160240" cy="0"/>
+          </a:xfrm>
+          <a:prstGeom prst="line">
+            <a:avLst/>
+          </a:prstGeom>
+          <a:ln w="25400">
+            <a:solidFill>
+              <a:schemeClr val="tx1"/>
+            </a:solidFill>
+            <a:prstDash val="dash"/>
+          </a:ln>
+        </p:spPr>
+        <p:style>
+          <a:lnRef idx="1">
+            <a:schemeClr val="accent1"/>
+          </a:lnRef>
+          <a:fillRef idx="0">
+            <a:schemeClr val="accent1"/>
+          </a:fillRef>
+          <a:effectRef idx="0">
+            <a:schemeClr val="accent1"/>
+          </a:effectRef>
+          <a:fontRef idx="minor">
+            <a:schemeClr val="tx1"/>
+          </a:fontRef>
+        </p:style>
+      </p:cxnSp>
+      <p:cxnSp>
+        <p:nvCxnSpPr>
+          <p:cNvPr id="10" name="Straight Connector 9"/>
+          <p:cNvCxnSpPr/>
+          <p:nvPr/>
+        </p:nvCxnSpPr>
+        <p:spPr>
+          <a:xfrm rot="3608984">
+            <a:off x="2517325" y="2418857"/>
+            <a:ext cx="2160240" cy="0"/>
+          </a:xfrm>
+          <a:prstGeom prst="line">
+            <a:avLst/>
+          </a:prstGeom>
+          <a:ln w="25400">
+            <a:solidFill>
+              <a:schemeClr val="tx1"/>
+            </a:solidFill>
+            <a:prstDash val="dash"/>
+          </a:ln>
+        </p:spPr>
+        <p:style>
+          <a:lnRef idx="1">
+            <a:schemeClr val="accent1"/>
+          </a:lnRef>
+          <a:fillRef idx="0">
+            <a:schemeClr val="accent1"/>
+          </a:fillRef>
+          <a:effectRef idx="0">
+            <a:schemeClr val="accent1"/>
+          </a:effectRef>
+          <a:fontRef idx="minor">
+            <a:schemeClr val="tx1"/>
+          </a:fontRef>
+        </p:style>
+      </p:cxnSp>
+      <p:cxnSp>
+        <p:nvCxnSpPr>
+          <p:cNvPr id="11" name="Straight Connector 10"/>
+          <p:cNvCxnSpPr/>
+          <p:nvPr/>
+        </p:nvCxnSpPr>
+        <p:spPr>
+          <a:xfrm rot="10808984">
+            <a:off x="4152567" y="3364146"/>
+            <a:ext cx="2160240" cy="0"/>
+          </a:xfrm>
+          <a:prstGeom prst="line">
+            <a:avLst/>
+          </a:prstGeom>
+          <a:ln w="25400">
+            <a:solidFill>
+              <a:schemeClr val="tx1"/>
+            </a:solidFill>
+            <a:prstDash val="dash"/>
+          </a:ln>
+        </p:spPr>
+        <p:style>
+          <a:lnRef idx="1">
+            <a:schemeClr val="accent1"/>
+          </a:lnRef>
+          <a:fillRef idx="0">
+            <a:schemeClr val="accent1"/>
+          </a:fillRef>
+          <a:effectRef idx="0">
+            <a:schemeClr val="accent1"/>
+          </a:effectRef>
+          <a:fontRef idx="minor">
+            <a:schemeClr val="tx1"/>
+          </a:fontRef>
+        </p:style>
+      </p:cxnSp>
+      <p:sp>
+        <p:nvSpPr>
+          <p:cNvPr id="13" name="Oval 55"/>
+          <p:cNvSpPr>
+            <a:spLocks noChangeAspect="1"/>
+          </p:cNvSpPr>
+          <p:nvPr/>
+        </p:nvSpPr>
+        <p:spPr>
+          <a:xfrm>
+            <a:off x="4090369" y="3310319"/>
+            <a:ext cx="105087" cy="105100"/>
+          </a:xfrm>
+          <a:prstGeom prst="ellipse">
+            <a:avLst/>
+          </a:prstGeom>
+          <a:solidFill>
+            <a:schemeClr val="tx1"/>
+          </a:solidFill>
+          <a:ln>
+            <a:noFill/>
+          </a:ln>
+        </p:spPr>
+        <p:style>
+          <a:lnRef idx="2">
+            <a:schemeClr val="accent1">
+              <a:shade val="50000"/>
+            </a:schemeClr>
+          </a:lnRef>
+          <a:fillRef idx="1">
+            <a:schemeClr val="accent1"/>
+          </a:fillRef>
+          <a:effectRef idx="0">
+            <a:schemeClr val="accent1"/>
+          </a:effectRef>
+          <a:fontRef idx="minor">
+            <a:schemeClr val="lt1"/>
+          </a:fontRef>
+        </p:style>
+        <p:txBody>
+          <a:bodyPr rtlCol="0" anchor="ctr"/>
+          <a:lstStyle/>
+          <a:p>
+            <a:pPr algn="ctr"/>
+            <a:endParaRPr lang="ru-RU"/>
+          </a:p>
+        </p:txBody>
+      </p:sp>
+    </p:spTree>
+    <p:extLst>
+      <p:ext uri="{BB962C8B-B14F-4D97-AF65-F5344CB8AC3E}">
+        <p14:creationId xmlns:p14="http://schemas.microsoft.com/office/powerpoint/2010/main" val="4259831680"/>
+      </p:ext>
+    </p:extLst>
+  </p:cSld>
+  <p:clrMapOvr>
+    <a:masterClrMapping/>
+  </p:clrMapOvr>
+</p:sld>
+</file>
+
+<file path=ppt/slides/slide5.xml><?xml version="1.0" encoding="utf-8"?>
+<p:sld xmlns:a="http://schemas.openxmlformats.org/drawingml/2006/main" xmlns:r="http://schemas.openxmlformats.org/officeDocument/2006/relationships" xmlns:p="http://schemas.openxmlformats.org/presentationml/2006/main">
+  <p:cSld>
+    <p:spTree>
+      <p:nvGrpSpPr>
+        <p:cNvPr id="1" name=""/>
+        <p:cNvGrpSpPr/>
+        <p:nvPr/>
+      </p:nvGrpSpPr>
+      <p:grpSpPr>
+        <a:xfrm>
+          <a:off x="0" y="0"/>
+          <a:ext cx="0" cy="0"/>
+          <a:chOff x="0" y="0"/>
+          <a:chExt cx="0" cy="0"/>
+        </a:xfrm>
+      </p:grpSpPr>
+      <p:sp>
+        <p:nvSpPr>
+          <p:cNvPr id="5" name="Oval 55"/>
+          <p:cNvSpPr>
+            <a:spLocks noChangeAspect="1"/>
+          </p:cNvSpPr>
+          <p:nvPr/>
+        </p:nvSpPr>
+        <p:spPr>
+          <a:xfrm>
+            <a:off x="3151304" y="3520465"/>
+            <a:ext cx="105087" cy="105100"/>
+          </a:xfrm>
+          <a:prstGeom prst="ellipse">
+            <a:avLst/>
+          </a:prstGeom>
+          <a:solidFill>
+            <a:schemeClr val="tx1"/>
+          </a:solidFill>
+          <a:ln>
+            <a:noFill/>
+          </a:ln>
+        </p:spPr>
+        <p:style>
+          <a:lnRef idx="2">
+            <a:schemeClr val="accent1">
+              <a:shade val="50000"/>
+            </a:schemeClr>
+          </a:lnRef>
+          <a:fillRef idx="1">
+            <a:schemeClr val="accent1"/>
+          </a:fillRef>
+          <a:effectRef idx="0">
+            <a:schemeClr val="accent1"/>
+          </a:effectRef>
+          <a:fontRef idx="minor">
+            <a:schemeClr val="lt1"/>
+          </a:fontRef>
+        </p:style>
+        <p:txBody>
+          <a:bodyPr rtlCol="0" anchor="ctr"/>
+          <a:lstStyle/>
+          <a:p>
+            <a:pPr algn="ctr"/>
+            <a:endParaRPr lang="ru-RU"/>
+          </a:p>
+        </p:txBody>
+      </p:sp>
+      <p:grpSp>
+        <p:nvGrpSpPr>
+          <p:cNvPr id="8" name="Group 7"/>
+          <p:cNvGrpSpPr/>
+          <p:nvPr/>
+        </p:nvGrpSpPr>
+        <p:grpSpPr>
+          <a:xfrm>
+            <a:off x="4283968" y="3465003"/>
+            <a:ext cx="216024" cy="216024"/>
+            <a:chOff x="1979712" y="1340768"/>
+            <a:chExt cx="864096" cy="864096"/>
+          </a:xfrm>
+        </p:grpSpPr>
+        <p:sp>
+          <p:nvSpPr>
+            <p:cNvPr id="6" name="Multiply 5"/>
+            <p:cNvSpPr/>
+            <p:nvPr/>
+          </p:nvSpPr>
+          <p:spPr>
+            <a:xfrm>
+              <a:off x="1979712" y="1340768"/>
+              <a:ext cx="864096" cy="864096"/>
+            </a:xfrm>
+            <a:prstGeom prst="mathMultiply">
+              <a:avLst>
+                <a:gd name="adj1" fmla="val 6634"/>
+              </a:avLst>
+            </a:prstGeom>
+            <a:solidFill>
+              <a:schemeClr val="tx1"/>
+            </a:solidFill>
+            <a:ln>
+              <a:solidFill>
+                <a:schemeClr val="tx1"/>
+              </a:solidFill>
+            </a:ln>
+          </p:spPr>
+          <p:style>
+            <a:lnRef idx="2">
+              <a:schemeClr val="accent1">
+                <a:shade val="50000"/>
+              </a:schemeClr>
+            </a:lnRef>
+            <a:fillRef idx="1">
+              <a:schemeClr val="accent1"/>
+            </a:fillRef>
+            <a:effectRef idx="0">
+              <a:schemeClr val="accent1"/>
+            </a:effectRef>
+            <a:fontRef idx="minor">
+              <a:schemeClr val="lt1"/>
+            </a:fontRef>
+          </p:style>
+          <p:txBody>
+            <a:bodyPr rtlCol="0" anchor="ctr"/>
+            <a:lstStyle/>
+            <a:p>
+              <a:pPr algn="ctr"/>
+              <a:endParaRPr lang="ru-RU"/>
+            </a:p>
+          </p:txBody>
+        </p:sp>
+        <p:sp>
+          <p:nvSpPr>
+            <p:cNvPr id="7" name="Plus 6"/>
+            <p:cNvSpPr/>
+            <p:nvPr/>
+          </p:nvSpPr>
+          <p:spPr>
+            <a:xfrm>
+              <a:off x="1979712" y="1340768"/>
+              <a:ext cx="864096" cy="864096"/>
+            </a:xfrm>
+            <a:prstGeom prst="mathPlus">
+              <a:avLst>
+                <a:gd name="adj1" fmla="val 7759"/>
+              </a:avLst>
+            </a:prstGeom>
+            <a:solidFill>
+              <a:schemeClr val="tx1"/>
+            </a:solidFill>
+            <a:ln>
+              <a:solidFill>
+                <a:schemeClr val="tx1"/>
+              </a:solidFill>
+            </a:ln>
+          </p:spPr>
+          <p:style>
+            <a:lnRef idx="2">
+              <a:schemeClr val="accent1">
+                <a:shade val="50000"/>
+              </a:schemeClr>
+            </a:lnRef>
+            <a:fillRef idx="1">
+              <a:schemeClr val="accent1"/>
+            </a:fillRef>
+            <a:effectRef idx="0">
+              <a:schemeClr val="accent1"/>
+            </a:effectRef>
+            <a:fontRef idx="minor">
+              <a:schemeClr val="lt1"/>
+            </a:fontRef>
+          </p:style>
+          <p:txBody>
+            <a:bodyPr rtlCol="0" anchor="ctr"/>
+            <a:lstStyle/>
+            <a:p>
+              <a:pPr algn="ctr"/>
+              <a:endParaRPr lang="ru-RU"/>
+            </a:p>
+          </p:txBody>
+        </p:sp>
+      </p:grpSp>
+      <p:sp>
+        <p:nvSpPr>
+          <p:cNvPr id="9" name="Oval 55"/>
+          <p:cNvSpPr>
+            <a:spLocks noChangeAspect="1"/>
+          </p:cNvSpPr>
+          <p:nvPr/>
+        </p:nvSpPr>
+        <p:spPr>
+          <a:xfrm>
+            <a:off x="4833612" y="4312554"/>
+            <a:ext cx="105087" cy="105100"/>
+          </a:xfrm>
+          <a:prstGeom prst="ellipse">
+            <a:avLst/>
+          </a:prstGeom>
+          <a:solidFill>
+            <a:schemeClr val="tx1"/>
+          </a:solidFill>
+          <a:ln>
+            <a:noFill/>
+          </a:ln>
+        </p:spPr>
+        <p:style>
+          <a:lnRef idx="2">
+            <a:schemeClr val="accent1">
+              <a:shade val="50000"/>
+            </a:schemeClr>
+          </a:lnRef>
+          <a:fillRef idx="1">
+            <a:schemeClr val="accent1"/>
+          </a:fillRef>
+          <a:effectRef idx="0">
+            <a:schemeClr val="accent1"/>
+          </a:effectRef>
+          <a:fontRef idx="minor">
+            <a:schemeClr val="lt1"/>
+          </a:fontRef>
+        </p:style>
+        <p:txBody>
+          <a:bodyPr rtlCol="0" anchor="ctr"/>
+          <a:lstStyle/>
+          <a:p>
+            <a:pPr algn="ctr"/>
+            <a:endParaRPr lang="ru-RU"/>
+          </a:p>
+        </p:txBody>
+      </p:sp>
+      <p:sp>
+        <p:nvSpPr>
+          <p:cNvPr id="10" name="Oval 55"/>
+          <p:cNvSpPr>
+            <a:spLocks noChangeAspect="1"/>
+          </p:cNvSpPr>
+          <p:nvPr/>
+        </p:nvSpPr>
+        <p:spPr>
+          <a:xfrm>
+            <a:off x="4833612" y="2728377"/>
+            <a:ext cx="105087" cy="105100"/>
+          </a:xfrm>
+          <a:prstGeom prst="ellipse">
+            <a:avLst/>
+          </a:prstGeom>
+          <a:solidFill>
+            <a:schemeClr val="tx1"/>
+          </a:solidFill>
+          <a:ln>
+            <a:noFill/>
+          </a:ln>
+        </p:spPr>
+        <p:style>
+          <a:lnRef idx="2">
+            <a:schemeClr val="accent1">
+              <a:shade val="50000"/>
+            </a:schemeClr>
+          </a:lnRef>
+          <a:fillRef idx="1">
+            <a:schemeClr val="accent1"/>
+          </a:fillRef>
+          <a:effectRef idx="0">
+            <a:schemeClr val="accent1"/>
+          </a:effectRef>
+          <a:fontRef idx="minor">
+            <a:schemeClr val="lt1"/>
+          </a:fontRef>
+        </p:style>
+        <p:txBody>
+          <a:bodyPr rtlCol="0" anchor="ctr"/>
+          <a:lstStyle/>
+          <a:p>
+            <a:pPr algn="ctr"/>
+            <a:endParaRPr lang="ru-RU"/>
+          </a:p>
+        </p:txBody>
+      </p:sp>
+      <p:sp>
+        <p:nvSpPr>
+          <p:cNvPr id="26" name="Isosceles Triangle 25"/>
+          <p:cNvSpPr/>
+          <p:nvPr/>
+        </p:nvSpPr>
+        <p:spPr>
+          <a:xfrm rot="16200000">
+            <a:off x="3252914" y="2731862"/>
+            <a:ext cx="1584176" cy="1682308"/>
+          </a:xfrm>
+          <a:prstGeom prst="triangle">
+            <a:avLst/>
+          </a:prstGeom>
+          <a:noFill/>
+          <a:ln>
+            <a:solidFill>
+              <a:schemeClr val="tx1"/>
+            </a:solidFill>
+          </a:ln>
+        </p:spPr>
+        <p:style>
+          <a:lnRef idx="2">
+            <a:schemeClr val="accent1">
+              <a:shade val="50000"/>
+            </a:schemeClr>
+          </a:lnRef>
+          <a:fillRef idx="1">
+            <a:schemeClr val="accent1"/>
+          </a:fillRef>
+          <a:effectRef idx="0">
+            <a:schemeClr val="accent1"/>
+          </a:effectRef>
+          <a:fontRef idx="minor">
+            <a:schemeClr val="lt1"/>
+          </a:fontRef>
+        </p:style>
+        <p:txBody>
+          <a:bodyPr rtlCol="0" anchor="ctr"/>
+          <a:lstStyle/>
+          <a:p>
+            <a:pPr algn="ctr"/>
+            <a:endParaRPr lang="ru-RU"/>
+          </a:p>
+        </p:txBody>
+      </p:sp>
+      <p:cxnSp>
+        <p:nvCxnSpPr>
+          <p:cNvPr id="27" name="Straight Connector 26"/>
+          <p:cNvCxnSpPr/>
+          <p:nvPr/>
+        </p:nvCxnSpPr>
+        <p:spPr>
+          <a:xfrm>
+            <a:off x="2267744" y="3573015"/>
+            <a:ext cx="936104" cy="1"/>
+          </a:xfrm>
+          <a:prstGeom prst="line">
+            <a:avLst/>
+          </a:prstGeom>
+          <a:ln w="25400">
+            <a:solidFill>
+              <a:schemeClr val="tx1"/>
+            </a:solidFill>
+          </a:ln>
+        </p:spPr>
+        <p:style>
+          <a:lnRef idx="1">
+            <a:schemeClr val="accent1"/>
+          </a:lnRef>
+          <a:fillRef idx="0">
+            <a:schemeClr val="accent1"/>
+          </a:fillRef>
+          <a:effectRef idx="0">
+            <a:schemeClr val="accent1"/>
+          </a:effectRef>
+          <a:fontRef idx="minor">
+            <a:schemeClr val="tx1"/>
+          </a:fontRef>
+        </p:style>
+      </p:cxnSp>
+      <p:cxnSp>
+        <p:nvCxnSpPr>
+          <p:cNvPr id="28" name="Straight Connector 27"/>
+          <p:cNvCxnSpPr/>
+          <p:nvPr/>
+        </p:nvCxnSpPr>
+        <p:spPr>
+          <a:xfrm flipH="1">
+            <a:off x="4895884" y="1988840"/>
+            <a:ext cx="468204" cy="790703"/>
+          </a:xfrm>
+          <a:prstGeom prst="line">
+            <a:avLst/>
+          </a:prstGeom>
+          <a:ln w="25400">
+            <a:solidFill>
+              <a:schemeClr val="tx1"/>
+            </a:solidFill>
+          </a:ln>
+        </p:spPr>
+        <p:style>
+          <a:lnRef idx="1">
+            <a:schemeClr val="accent1"/>
+          </a:lnRef>
+          <a:fillRef idx="0">
+            <a:schemeClr val="accent1"/>
+          </a:fillRef>
+          <a:effectRef idx="0">
+            <a:schemeClr val="accent1"/>
+          </a:effectRef>
+          <a:fontRef idx="minor">
+            <a:schemeClr val="tx1"/>
+          </a:fontRef>
+        </p:style>
+      </p:cxnSp>
+      <p:cxnSp>
+        <p:nvCxnSpPr>
+          <p:cNvPr id="29" name="Straight Connector 28"/>
+          <p:cNvCxnSpPr/>
+          <p:nvPr/>
+        </p:nvCxnSpPr>
+        <p:spPr>
+          <a:xfrm flipH="1" flipV="1">
+            <a:off x="4890188" y="4366524"/>
+            <a:ext cx="473900" cy="790668"/>
+          </a:xfrm>
+          <a:prstGeom prst="line">
+            <a:avLst/>
+          </a:prstGeom>
+          <a:ln w="25400">
+            <a:solidFill>
+              <a:schemeClr val="tx1"/>
+            </a:solidFill>
+          </a:ln>
+        </p:spPr>
+        <p:style>
+          <a:lnRef idx="1">
+            <a:schemeClr val="accent1"/>
+          </a:lnRef>
+          <a:fillRef idx="0">
+            <a:schemeClr val="accent1"/>
+          </a:fillRef>
+          <a:effectRef idx="0">
+            <a:schemeClr val="accent1"/>
+          </a:effectRef>
+          <a:fontRef idx="minor">
+            <a:schemeClr val="tx1"/>
+          </a:fontRef>
+        </p:style>
+      </p:cxnSp>
+      <p:cxnSp>
+        <p:nvCxnSpPr>
+          <p:cNvPr id="33" name="Straight Connector 32"/>
+          <p:cNvCxnSpPr/>
+          <p:nvPr/>
+        </p:nvCxnSpPr>
+        <p:spPr>
+          <a:xfrm>
+            <a:off x="2771800" y="2728377"/>
+            <a:ext cx="432048" cy="812258"/>
+          </a:xfrm>
+          <a:prstGeom prst="line">
+            <a:avLst/>
+          </a:prstGeom>
+          <a:ln w="25400">
+            <a:solidFill>
+              <a:schemeClr val="tx1"/>
+            </a:solidFill>
+            <a:prstDash val="dash"/>
+          </a:ln>
+        </p:spPr>
+        <p:style>
+          <a:lnRef idx="1">
+            <a:schemeClr val="accent1"/>
+          </a:lnRef>
+          <a:fillRef idx="0">
+            <a:schemeClr val="accent1"/>
+          </a:fillRef>
+          <a:effectRef idx="0">
+            <a:schemeClr val="accent1"/>
+          </a:effectRef>
+          <a:fontRef idx="minor">
+            <a:schemeClr val="tx1"/>
+          </a:fontRef>
+        </p:style>
+      </p:cxnSp>
+      <p:cxnSp>
+        <p:nvCxnSpPr>
+          <p:cNvPr id="35" name="Straight Connector 34"/>
+          <p:cNvCxnSpPr/>
+          <p:nvPr/>
+        </p:nvCxnSpPr>
+        <p:spPr>
+          <a:xfrm>
+            <a:off x="4391980" y="1988840"/>
+            <a:ext cx="494175" cy="782940"/>
+          </a:xfrm>
+          <a:prstGeom prst="line">
+            <a:avLst/>
+          </a:prstGeom>
+          <a:ln w="25400">
+            <a:solidFill>
+              <a:schemeClr val="tx1"/>
+            </a:solidFill>
+            <a:prstDash val="dash"/>
+          </a:ln>
+        </p:spPr>
+        <p:style>
+          <a:lnRef idx="1">
+            <a:schemeClr val="accent1"/>
+          </a:lnRef>
+          <a:fillRef idx="0">
+            <a:schemeClr val="accent1"/>
+          </a:fillRef>
+          <a:effectRef idx="0">
+            <a:schemeClr val="accent1"/>
+          </a:effectRef>
+          <a:fontRef idx="minor">
+            <a:schemeClr val="tx1"/>
+          </a:fontRef>
+        </p:style>
+      </p:cxnSp>
+      <p:cxnSp>
+        <p:nvCxnSpPr>
+          <p:cNvPr id="37" name="Straight Connector 36"/>
+          <p:cNvCxnSpPr/>
+          <p:nvPr/>
+        </p:nvCxnSpPr>
+        <p:spPr>
+          <a:xfrm flipH="1">
+            <a:off x="2771800" y="3575744"/>
+            <a:ext cx="432048" cy="841910"/>
+          </a:xfrm>
+          <a:prstGeom prst="line">
+            <a:avLst/>
+          </a:prstGeom>
+          <a:ln w="25400">
+            <a:solidFill>
+              <a:schemeClr val="tx1"/>
+            </a:solidFill>
+            <a:prstDash val="dash"/>
+          </a:ln>
+        </p:spPr>
+        <p:style>
+          <a:lnRef idx="1">
+            <a:schemeClr val="accent1"/>
+          </a:lnRef>
+          <a:fillRef idx="0">
+            <a:schemeClr val="accent1"/>
+          </a:fillRef>
+          <a:effectRef idx="0">
+            <a:schemeClr val="accent1"/>
+          </a:effectRef>
+          <a:fontRef idx="minor">
+            <a:schemeClr val="tx1"/>
+          </a:fontRef>
+        </p:style>
+      </p:cxnSp>
+      <p:cxnSp>
+        <p:nvCxnSpPr>
+          <p:cNvPr id="41" name="Straight Connector 40"/>
+          <p:cNvCxnSpPr>
+            <a:stCxn id="26" idx="2"/>
+          </p:cNvCxnSpPr>
+          <p:nvPr/>
+        </p:nvCxnSpPr>
+        <p:spPr>
+          <a:xfrm flipH="1">
+            <a:off x="4499992" y="4365104"/>
+            <a:ext cx="386164" cy="720080"/>
+          </a:xfrm>
+          <a:prstGeom prst="line">
+            <a:avLst/>
+          </a:prstGeom>
+          <a:ln w="25400">
+            <a:solidFill>
+              <a:schemeClr val="tx1"/>
+            </a:solidFill>
+            <a:prstDash val="dash"/>
+          </a:ln>
+        </p:spPr>
+        <p:style>
+          <a:lnRef idx="1">
+            <a:schemeClr val="accent1"/>
+          </a:lnRef>
+          <a:fillRef idx="0">
+            <a:schemeClr val="accent1"/>
+          </a:fillRef>
+          <a:effectRef idx="0">
+            <a:schemeClr val="accent1"/>
+          </a:effectRef>
+          <a:fontRef idx="minor">
+            <a:schemeClr val="tx1"/>
+          </a:fontRef>
+        </p:style>
+      </p:cxnSp>
+      <p:cxnSp>
+        <p:nvCxnSpPr>
+          <p:cNvPr id="44" name="Straight Connector 43"/>
+          <p:cNvCxnSpPr/>
+          <p:nvPr/>
+        </p:nvCxnSpPr>
+        <p:spPr>
+          <a:xfrm>
+            <a:off x="4905612" y="2778178"/>
+            <a:ext cx="1075228" cy="74755"/>
+          </a:xfrm>
+          <a:prstGeom prst="line">
+            <a:avLst/>
+          </a:prstGeom>
+          <a:ln w="25400">
+            <a:solidFill>
+              <a:schemeClr val="tx1"/>
+            </a:solidFill>
+            <a:prstDash val="dash"/>
+          </a:ln>
+        </p:spPr>
+        <p:style>
+          <a:lnRef idx="1">
+            <a:schemeClr val="accent1"/>
+          </a:lnRef>
+          <a:fillRef idx="0">
+            <a:schemeClr val="accent1"/>
+          </a:fillRef>
+          <a:effectRef idx="0">
+            <a:schemeClr val="accent1"/>
+          </a:effectRef>
+          <a:fontRef idx="minor">
+            <a:schemeClr val="tx1"/>
+          </a:fontRef>
+        </p:style>
+      </p:cxnSp>
+      <p:cxnSp>
+        <p:nvCxnSpPr>
+          <p:cNvPr id="46" name="Straight Connector 45"/>
+          <p:cNvCxnSpPr/>
+          <p:nvPr/>
+        </p:nvCxnSpPr>
+        <p:spPr>
+          <a:xfrm flipV="1">
+            <a:off x="4903853" y="4273642"/>
+            <a:ext cx="1232867" cy="89708"/>
+          </a:xfrm>
+          <a:prstGeom prst="line">
+            <a:avLst/>
+          </a:prstGeom>
+          <a:ln w="25400">
+            <a:solidFill>
+              <a:schemeClr val="tx1"/>
+            </a:solidFill>
+            <a:prstDash val="dash"/>
+          </a:ln>
+        </p:spPr>
+        <p:style>
+          <a:lnRef idx="1">
+            <a:schemeClr val="accent1"/>
+          </a:lnRef>
+          <a:fillRef idx="0">
+            <a:schemeClr val="accent1"/>
+          </a:fillRef>
+          <a:effectRef idx="0">
+            <a:schemeClr val="accent1"/>
+          </a:effectRef>
+          <a:fontRef idx="minor">
+            <a:schemeClr val="tx1"/>
+          </a:fontRef>
+        </p:style>
+      </p:cxnSp>
+    </p:spTree>
+    <p:extLst>
+      <p:ext uri="{BB962C8B-B14F-4D97-AF65-F5344CB8AC3E}">
+        <p14:creationId xmlns:p14="http://schemas.microsoft.com/office/powerpoint/2010/main" val="3322306795"/>
+      </p:ext>
+    </p:extLst>
+  </p:cSld>
+  <p:clrMapOvr>
+    <a:masterClrMapping/>
+  </p:clrMapOvr>
+</p:sld>
+</file>
+
+<file path=ppt/slides/slide6.xml><?xml version="1.0" encoding="utf-8"?>
+<p:sld xmlns:a="http://schemas.openxmlformats.org/drawingml/2006/main" xmlns:r="http://schemas.openxmlformats.org/officeDocument/2006/relationships" xmlns:p="http://schemas.openxmlformats.org/presentationml/2006/main">
+  <p:cSld>
+    <p:spTree>
+      <p:nvGrpSpPr>
+        <p:cNvPr id="1" name=""/>
+        <p:cNvGrpSpPr/>
+        <p:nvPr/>
+      </p:nvGrpSpPr>
+      <p:grpSpPr>
+        <a:xfrm>
+          <a:off x="0" y="0"/>
+          <a:ext cx="0" cy="0"/>
+          <a:chOff x="0" y="0"/>
+          <a:chExt cx="0" cy="0"/>
+        </a:xfrm>
+      </p:grpSpPr>
+      <p:sp>
+        <p:nvSpPr>
+          <p:cNvPr id="10" name="Isosceles Triangle 9"/>
+          <p:cNvSpPr/>
+          <p:nvPr/>
+        </p:nvSpPr>
+        <p:spPr>
+          <a:xfrm rot="16200000">
+            <a:off x="3252914" y="2731862"/>
+            <a:ext cx="1584176" cy="1682308"/>
+          </a:xfrm>
+          <a:prstGeom prst="triangle">
+            <a:avLst/>
+          </a:prstGeom>
+          <a:pattFill prst="wdUpDiag">
+            <a:fgClr>
+              <a:schemeClr val="tx1"/>
+            </a:fgClr>
+            <a:bgClr>
+              <a:schemeClr val="bg1"/>
+            </a:bgClr>
+          </a:pattFill>
+          <a:ln>
+            <a:solidFill>
+              <a:schemeClr val="tx1"/>
+            </a:solidFill>
+          </a:ln>
+        </p:spPr>
+        <p:style>
+          <a:lnRef idx="2">
+            <a:schemeClr val="accent1">
+              <a:shade val="50000"/>
+            </a:schemeClr>
+          </a:lnRef>
+          <a:fillRef idx="1">
+            <a:schemeClr val="accent1"/>
+          </a:fillRef>
+          <a:effectRef idx="0">
+            <a:schemeClr val="accent1"/>
+          </a:effectRef>
+          <a:fontRef idx="minor">
+            <a:schemeClr val="lt1"/>
+          </a:fontRef>
+        </p:style>
+        <p:txBody>
+          <a:bodyPr rtlCol="0" anchor="ctr"/>
+          <a:lstStyle/>
+          <a:p>
+            <a:pPr algn="ctr"/>
+            <a:endParaRPr lang="ru-RU"/>
+          </a:p>
+        </p:txBody>
+      </p:sp>
+      <p:sp>
+        <p:nvSpPr>
+          <p:cNvPr id="4" name="Oval 55"/>
+          <p:cNvSpPr>
+            <a:spLocks noChangeAspect="1"/>
+          </p:cNvSpPr>
+          <p:nvPr/>
+        </p:nvSpPr>
+        <p:spPr>
+          <a:xfrm>
+            <a:off x="3151304" y="3520465"/>
+            <a:ext cx="105087" cy="105100"/>
+          </a:xfrm>
+          <a:prstGeom prst="ellipse">
+            <a:avLst/>
+          </a:prstGeom>
+          <a:solidFill>
+            <a:schemeClr val="tx1"/>
+          </a:solidFill>
+          <a:ln>
+            <a:noFill/>
+          </a:ln>
+        </p:spPr>
+        <p:style>
+          <a:lnRef idx="2">
+            <a:schemeClr val="accent1">
+              <a:shade val="50000"/>
+            </a:schemeClr>
+          </a:lnRef>
+          <a:fillRef idx="1">
+            <a:schemeClr val="accent1"/>
+          </a:fillRef>
+          <a:effectRef idx="0">
+            <a:schemeClr val="accent1"/>
+          </a:effectRef>
+          <a:fontRef idx="minor">
+            <a:schemeClr val="lt1"/>
+          </a:fontRef>
+        </p:style>
+        <p:txBody>
+          <a:bodyPr rtlCol="0" anchor="ctr"/>
+          <a:lstStyle/>
+          <a:p>
+            <a:pPr algn="ctr"/>
+            <a:endParaRPr lang="ru-RU"/>
+          </a:p>
+        </p:txBody>
+      </p:sp>
+      <p:sp>
+        <p:nvSpPr>
+          <p:cNvPr id="8" name="Oval 55"/>
+          <p:cNvSpPr>
+            <a:spLocks noChangeAspect="1"/>
+          </p:cNvSpPr>
+          <p:nvPr/>
+        </p:nvSpPr>
+        <p:spPr>
+          <a:xfrm>
+            <a:off x="4833612" y="4312554"/>
+            <a:ext cx="105087" cy="105100"/>
+          </a:xfrm>
+          <a:prstGeom prst="ellipse">
+            <a:avLst/>
+          </a:prstGeom>
+          <a:solidFill>
+            <a:schemeClr val="tx1"/>
+          </a:solidFill>
+          <a:ln>
+            <a:noFill/>
+          </a:ln>
+        </p:spPr>
+        <p:style>
+          <a:lnRef idx="2">
+            <a:schemeClr val="accent1">
+              <a:shade val="50000"/>
+            </a:schemeClr>
+          </a:lnRef>
+          <a:fillRef idx="1">
+            <a:schemeClr val="accent1"/>
+          </a:fillRef>
+          <a:effectRef idx="0">
+            <a:schemeClr val="accent1"/>
+          </a:effectRef>
+          <a:fontRef idx="minor">
+            <a:schemeClr val="lt1"/>
+          </a:fontRef>
+        </p:style>
+        <p:txBody>
+          <a:bodyPr rtlCol="0" anchor="ctr"/>
+          <a:lstStyle/>
+          <a:p>
+            <a:pPr algn="ctr"/>
+            <a:endParaRPr lang="ru-RU"/>
+          </a:p>
+        </p:txBody>
+      </p:sp>
+      <p:sp>
+        <p:nvSpPr>
+          <p:cNvPr id="9" name="Oval 55"/>
+          <p:cNvSpPr>
+            <a:spLocks noChangeAspect="1"/>
+          </p:cNvSpPr>
+          <p:nvPr/>
+        </p:nvSpPr>
+        <p:spPr>
+          <a:xfrm>
+            <a:off x="4833612" y="2728377"/>
+            <a:ext cx="105087" cy="105100"/>
+          </a:xfrm>
+          <a:prstGeom prst="ellipse">
+            <a:avLst/>
+          </a:prstGeom>
+          <a:solidFill>
+            <a:schemeClr val="tx1"/>
+          </a:solidFill>
+          <a:ln>
+            <a:noFill/>
+          </a:ln>
+        </p:spPr>
+        <p:style>
+          <a:lnRef idx="2">
+            <a:schemeClr val="accent1">
+              <a:shade val="50000"/>
+            </a:schemeClr>
+          </a:lnRef>
+          <a:fillRef idx="1">
+            <a:schemeClr val="accent1"/>
+          </a:fillRef>
+          <a:effectRef idx="0">
+            <a:schemeClr val="accent1"/>
+          </a:effectRef>
+          <a:fontRef idx="minor">
+            <a:schemeClr val="lt1"/>
+          </a:fontRef>
+        </p:style>
+        <p:txBody>
+          <a:bodyPr rtlCol="0" anchor="ctr"/>
+          <a:lstStyle/>
+          <a:p>
+            <a:pPr algn="ctr"/>
+            <a:endParaRPr lang="ru-RU"/>
+          </a:p>
+        </p:txBody>
+      </p:sp>
+      <p:cxnSp>
+        <p:nvCxnSpPr>
+          <p:cNvPr id="11" name="Straight Connector 10"/>
+          <p:cNvCxnSpPr/>
+          <p:nvPr/>
+        </p:nvCxnSpPr>
+        <p:spPr>
+          <a:xfrm>
+            <a:off x="2267744" y="3573015"/>
+            <a:ext cx="936104" cy="1"/>
+          </a:xfrm>
+          <a:prstGeom prst="line">
+            <a:avLst/>
+          </a:prstGeom>
+          <a:ln w="25400">
+            <a:solidFill>
+              <a:schemeClr val="tx1"/>
+            </a:solidFill>
+          </a:ln>
+        </p:spPr>
+        <p:style>
+          <a:lnRef idx="1">
+            <a:schemeClr val="accent1"/>
+          </a:lnRef>
+          <a:fillRef idx="0">
+            <a:schemeClr val="accent1"/>
+          </a:fillRef>
+          <a:effectRef idx="0">
+            <a:schemeClr val="accent1"/>
+          </a:effectRef>
+          <a:fontRef idx="minor">
+            <a:schemeClr val="tx1"/>
+          </a:fontRef>
+        </p:style>
+      </p:cxnSp>
+      <p:cxnSp>
+        <p:nvCxnSpPr>
+          <p:cNvPr id="12" name="Straight Connector 11"/>
+          <p:cNvCxnSpPr/>
+          <p:nvPr/>
+        </p:nvCxnSpPr>
+        <p:spPr>
+          <a:xfrm flipH="1">
+            <a:off x="4895884" y="1988840"/>
+            <a:ext cx="468204" cy="790703"/>
+          </a:xfrm>
+          <a:prstGeom prst="line">
+            <a:avLst/>
+          </a:prstGeom>
+          <a:ln w="25400">
+            <a:solidFill>
+              <a:schemeClr val="tx1"/>
+            </a:solidFill>
+          </a:ln>
+        </p:spPr>
+        <p:style>
+          <a:lnRef idx="1">
+            <a:schemeClr val="accent1"/>
+          </a:lnRef>
+          <a:fillRef idx="0">
+            <a:schemeClr val="accent1"/>
+          </a:fillRef>
+          <a:effectRef idx="0">
+            <a:schemeClr val="accent1"/>
+          </a:effectRef>
+          <a:fontRef idx="minor">
+            <a:schemeClr val="tx1"/>
+          </a:fontRef>
+        </p:style>
+      </p:cxnSp>
+      <p:cxnSp>
+        <p:nvCxnSpPr>
+          <p:cNvPr id="13" name="Straight Connector 12"/>
+          <p:cNvCxnSpPr/>
+          <p:nvPr/>
+        </p:nvCxnSpPr>
+        <p:spPr>
+          <a:xfrm flipH="1" flipV="1">
+            <a:off x="4890188" y="4366524"/>
+            <a:ext cx="473900" cy="790668"/>
+          </a:xfrm>
+          <a:prstGeom prst="line">
+            <a:avLst/>
+          </a:prstGeom>
+          <a:ln w="25400">
+            <a:solidFill>
+              <a:schemeClr val="tx1"/>
+            </a:solidFill>
+          </a:ln>
+        </p:spPr>
+        <p:style>
+          <a:lnRef idx="1">
+            <a:schemeClr val="accent1"/>
+          </a:lnRef>
+          <a:fillRef idx="0">
+            <a:schemeClr val="accent1"/>
+          </a:fillRef>
+          <a:effectRef idx="0">
+            <a:schemeClr val="accent1"/>
+          </a:effectRef>
+          <a:fontRef idx="minor">
+            <a:schemeClr val="tx1"/>
+          </a:fontRef>
+        </p:style>
+      </p:cxnSp>
+      <p:cxnSp>
+        <p:nvCxnSpPr>
+          <p:cNvPr id="14" name="Straight Connector 13"/>
+          <p:cNvCxnSpPr/>
+          <p:nvPr/>
+        </p:nvCxnSpPr>
+        <p:spPr>
+          <a:xfrm>
+            <a:off x="2771800" y="2728377"/>
+            <a:ext cx="432048" cy="812258"/>
+          </a:xfrm>
+          <a:prstGeom prst="line">
+            <a:avLst/>
+          </a:prstGeom>
+          <a:ln w="25400">
+            <a:solidFill>
+              <a:schemeClr val="tx1"/>
+            </a:solidFill>
+            <a:prstDash val="dash"/>
+          </a:ln>
+        </p:spPr>
+        <p:style>
+          <a:lnRef idx="1">
+            <a:schemeClr val="accent1"/>
+          </a:lnRef>
+          <a:fillRef idx="0">
+            <a:schemeClr val="accent1"/>
+          </a:fillRef>
+          <a:effectRef idx="0">
+            <a:schemeClr val="accent1"/>
+          </a:effectRef>
+          <a:fontRef idx="minor">
+            <a:schemeClr val="tx1"/>
+          </a:fontRef>
+        </p:style>
+      </p:cxnSp>
+      <p:cxnSp>
+        <p:nvCxnSpPr>
+          <p:cNvPr id="15" name="Straight Connector 14"/>
+          <p:cNvCxnSpPr/>
+          <p:nvPr/>
+        </p:nvCxnSpPr>
+        <p:spPr>
+          <a:xfrm>
+            <a:off x="4391980" y="1988840"/>
+            <a:ext cx="494175" cy="782940"/>
+          </a:xfrm>
+          <a:prstGeom prst="line">
+            <a:avLst/>
+          </a:prstGeom>
+          <a:ln w="25400">
+            <a:solidFill>
+              <a:schemeClr val="tx1"/>
+            </a:solidFill>
+            <a:prstDash val="dash"/>
+          </a:ln>
+        </p:spPr>
+        <p:style>
+          <a:lnRef idx="1">
+            <a:schemeClr val="accent1"/>
+          </a:lnRef>
+          <a:fillRef idx="0">
+            <a:schemeClr val="accent1"/>
+          </a:fillRef>
+          <a:effectRef idx="0">
+            <a:schemeClr val="accent1"/>
+          </a:effectRef>
+          <a:fontRef idx="minor">
+            <a:schemeClr val="tx1"/>
+          </a:fontRef>
+        </p:style>
+      </p:cxnSp>
+      <p:cxnSp>
+        <p:nvCxnSpPr>
+          <p:cNvPr id="16" name="Straight Connector 15"/>
+          <p:cNvCxnSpPr/>
+          <p:nvPr/>
+        </p:nvCxnSpPr>
+        <p:spPr>
+          <a:xfrm flipH="1">
+            <a:off x="2771800" y="3575744"/>
+            <a:ext cx="432048" cy="841910"/>
+          </a:xfrm>
+          <a:prstGeom prst="line">
+            <a:avLst/>
+          </a:prstGeom>
+          <a:ln w="25400">
+            <a:solidFill>
+              <a:schemeClr val="tx1"/>
+            </a:solidFill>
+            <a:prstDash val="dash"/>
+          </a:ln>
+        </p:spPr>
+        <p:style>
+          <a:lnRef idx="1">
+            <a:schemeClr val="accent1"/>
+          </a:lnRef>
+          <a:fillRef idx="0">
+            <a:schemeClr val="accent1"/>
+          </a:fillRef>
+          <a:effectRef idx="0">
+            <a:schemeClr val="accent1"/>
+          </a:effectRef>
+          <a:fontRef idx="minor">
+            <a:schemeClr val="tx1"/>
+          </a:fontRef>
+        </p:style>
+      </p:cxnSp>
+      <p:cxnSp>
+        <p:nvCxnSpPr>
+          <p:cNvPr id="17" name="Straight Connector 16"/>
+          <p:cNvCxnSpPr>
+            <a:stCxn id="10" idx="2"/>
+          </p:cNvCxnSpPr>
+          <p:nvPr/>
+        </p:nvCxnSpPr>
+        <p:spPr>
+          <a:xfrm flipH="1">
+            <a:off x="4499992" y="4365104"/>
+            <a:ext cx="386164" cy="720080"/>
+          </a:xfrm>
+          <a:prstGeom prst="line">
+            <a:avLst/>
+          </a:prstGeom>
+          <a:ln w="25400">
+            <a:solidFill>
+              <a:schemeClr val="tx1"/>
+            </a:solidFill>
+            <a:prstDash val="dash"/>
+          </a:ln>
+        </p:spPr>
+        <p:style>
+          <a:lnRef idx="1">
+            <a:schemeClr val="accent1"/>
+          </a:lnRef>
+          <a:fillRef idx="0">
+            <a:schemeClr val="accent1"/>
+          </a:fillRef>
+          <a:effectRef idx="0">
+            <a:schemeClr val="accent1"/>
+          </a:effectRef>
+          <a:fontRef idx="minor">
+            <a:schemeClr val="tx1"/>
+          </a:fontRef>
+        </p:style>
+      </p:cxnSp>
+      <p:cxnSp>
+        <p:nvCxnSpPr>
+          <p:cNvPr id="18" name="Straight Connector 17"/>
+          <p:cNvCxnSpPr/>
+          <p:nvPr/>
+        </p:nvCxnSpPr>
+        <p:spPr>
+          <a:xfrm>
+            <a:off x="4905612" y="2778178"/>
+            <a:ext cx="1075228" cy="74755"/>
+          </a:xfrm>
+          <a:prstGeom prst="line">
+            <a:avLst/>
+          </a:prstGeom>
+          <a:ln w="25400">
+            <a:solidFill>
+              <a:schemeClr val="tx1"/>
+            </a:solidFill>
+            <a:prstDash val="dash"/>
+          </a:ln>
+        </p:spPr>
+        <p:style>
+          <a:lnRef idx="1">
+            <a:schemeClr val="accent1"/>
+          </a:lnRef>
+          <a:fillRef idx="0">
+            <a:schemeClr val="accent1"/>
+          </a:fillRef>
+          <a:effectRef idx="0">
+            <a:schemeClr val="accent1"/>
+          </a:effectRef>
+          <a:fontRef idx="minor">
+            <a:schemeClr val="tx1"/>
+          </a:fontRef>
+        </p:style>
+      </p:cxnSp>
+      <p:cxnSp>
+        <p:nvCxnSpPr>
+          <p:cNvPr id="19" name="Straight Connector 18"/>
+          <p:cNvCxnSpPr/>
+          <p:nvPr/>
+        </p:nvCxnSpPr>
+        <p:spPr>
+          <a:xfrm flipV="1">
+            <a:off x="4903853" y="4273642"/>
+            <a:ext cx="1232867" cy="89708"/>
+          </a:xfrm>
+          <a:prstGeom prst="line">
+            <a:avLst/>
+          </a:prstGeom>
+          <a:ln w="25400">
+            <a:solidFill>
+              <a:schemeClr val="tx1"/>
+            </a:solidFill>
+            <a:prstDash val="dash"/>
+          </a:ln>
+        </p:spPr>
+        <p:style>
+          <a:lnRef idx="1">
+            <a:schemeClr val="accent1"/>
+          </a:lnRef>
+          <a:fillRef idx="0">
+            <a:schemeClr val="accent1"/>
+          </a:fillRef>
+          <a:effectRef idx="0">
+            <a:schemeClr val="accent1"/>
+          </a:effectRef>
+          <a:fontRef idx="minor">
+            <a:schemeClr val="tx1"/>
+          </a:fontRef>
+        </p:style>
+      </p:cxnSp>
+      <p:sp>
+        <p:nvSpPr>
+          <p:cNvPr id="20" name="Oval 55"/>
+          <p:cNvSpPr>
+            <a:spLocks noChangeAspect="1"/>
+          </p:cNvSpPr>
+          <p:nvPr/>
+        </p:nvSpPr>
+        <p:spPr>
+          <a:xfrm>
+            <a:off x="4005664" y="3127332"/>
+            <a:ext cx="105087" cy="105100"/>
+          </a:xfrm>
+          <a:prstGeom prst="ellipse">
+            <a:avLst/>
+          </a:prstGeom>
+          <a:solidFill>
+            <a:schemeClr val="tx1"/>
+          </a:solidFill>
+          <a:ln>
+            <a:noFill/>
+          </a:ln>
+        </p:spPr>
+        <p:style>
+          <a:lnRef idx="2">
+            <a:schemeClr val="accent1">
+              <a:shade val="50000"/>
+            </a:schemeClr>
+          </a:lnRef>
+          <a:fillRef idx="1">
+            <a:schemeClr val="accent1"/>
+          </a:fillRef>
+          <a:effectRef idx="0">
+            <a:schemeClr val="accent1"/>
+          </a:effectRef>
+          <a:fontRef idx="minor">
+            <a:schemeClr val="lt1"/>
+          </a:fontRef>
+        </p:style>
+        <p:txBody>
+          <a:bodyPr rtlCol="0" anchor="ctr"/>
+          <a:lstStyle/>
+          <a:p>
+            <a:pPr algn="ctr"/>
+            <a:endParaRPr lang="ru-RU"/>
+          </a:p>
+        </p:txBody>
+      </p:sp>
+      <p:sp>
+        <p:nvSpPr>
+          <p:cNvPr id="21" name="Oval 55"/>
+          <p:cNvSpPr>
+            <a:spLocks noChangeAspect="1"/>
+          </p:cNvSpPr>
+          <p:nvPr/>
+        </p:nvSpPr>
+        <p:spPr>
+          <a:xfrm>
+            <a:off x="4054304" y="3938876"/>
+            <a:ext cx="105087" cy="105100"/>
+          </a:xfrm>
+          <a:prstGeom prst="ellipse">
+            <a:avLst/>
+          </a:prstGeom>
+          <a:solidFill>
+            <a:schemeClr val="tx1"/>
+          </a:solidFill>
+          <a:ln>
+            <a:noFill/>
+          </a:ln>
+        </p:spPr>
+        <p:style>
+          <a:lnRef idx="2">
+            <a:schemeClr val="accent1">
+              <a:shade val="50000"/>
+            </a:schemeClr>
+          </a:lnRef>
+          <a:fillRef idx="1">
+            <a:schemeClr val="accent1"/>
+          </a:fillRef>
+          <a:effectRef idx="0">
+            <a:schemeClr val="accent1"/>
+          </a:effectRef>
+          <a:fontRef idx="minor">
+            <a:schemeClr val="lt1"/>
+          </a:fontRef>
+        </p:style>
+        <p:txBody>
+          <a:bodyPr rtlCol="0" anchor="ctr"/>
+          <a:lstStyle/>
+          <a:p>
+            <a:pPr algn="ctr"/>
+            <a:endParaRPr lang="ru-RU"/>
+          </a:p>
+        </p:txBody>
+      </p:sp>
+      <p:cxnSp>
+        <p:nvCxnSpPr>
+          <p:cNvPr id="22" name="Straight Connector 21"/>
+          <p:cNvCxnSpPr/>
+          <p:nvPr/>
+        </p:nvCxnSpPr>
+        <p:spPr>
+          <a:xfrm>
+            <a:off x="3559976" y="2377484"/>
+            <a:ext cx="494175" cy="782940"/>
+          </a:xfrm>
+          <a:prstGeom prst="line">
+            <a:avLst/>
+          </a:prstGeom>
+          <a:ln w="25400">
+            <a:solidFill>
+              <a:schemeClr val="tx1"/>
+            </a:solidFill>
+            <a:prstDash val="dash"/>
+          </a:ln>
+        </p:spPr>
+        <p:style>
+          <a:lnRef idx="1">
+            <a:schemeClr val="accent1"/>
+          </a:lnRef>
+          <a:fillRef idx="0">
+            <a:schemeClr val="accent1"/>
+          </a:fillRef>
+          <a:effectRef idx="0">
+            <a:schemeClr val="accent1"/>
+          </a:effectRef>
+          <a:fontRef idx="minor">
+            <a:schemeClr val="tx1"/>
+          </a:fontRef>
+        </p:style>
+      </p:cxnSp>
+      <p:cxnSp>
+        <p:nvCxnSpPr>
+          <p:cNvPr id="24" name="Straight Connector 23"/>
+          <p:cNvCxnSpPr/>
+          <p:nvPr/>
+        </p:nvCxnSpPr>
+        <p:spPr>
+          <a:xfrm flipH="1">
+            <a:off x="3717632" y="3995336"/>
+            <a:ext cx="386164" cy="720080"/>
+          </a:xfrm>
+          <a:prstGeom prst="line">
+            <a:avLst/>
+          </a:prstGeom>
+          <a:ln w="25400">
+            <a:solidFill>
+              <a:schemeClr val="tx1"/>
+            </a:solidFill>
+            <a:prstDash val="dash"/>
+          </a:ln>
+        </p:spPr>
+        <p:style>
+          <a:lnRef idx="1">
+            <a:schemeClr val="accent1"/>
+          </a:lnRef>
+          <a:fillRef idx="0">
+            <a:schemeClr val="accent1"/>
+          </a:fillRef>
+          <a:effectRef idx="0">
+            <a:schemeClr val="accent1"/>
+          </a:effectRef>
+          <a:fontRef idx="minor">
+            <a:schemeClr val="tx1"/>
+          </a:fontRef>
+        </p:style>
+      </p:cxnSp>
+    </p:spTree>
+    <p:extLst>
+      <p:ext uri="{BB962C8B-B14F-4D97-AF65-F5344CB8AC3E}">
+        <p14:creationId xmlns:p14="http://schemas.microsoft.com/office/powerpoint/2010/main" val="3995972565"/>
+      </p:ext>
+    </p:extLst>
+  </p:cSld>
+  <p:clrMapOvr>
+    <a:masterClrMapping/>
+  </p:clrMapOvr>
+</p:sld>
+</file>
+
 <file path=ppt/theme/theme1.xml><?xml version="1.0" encoding="utf-8"?>
 <a:theme xmlns:a="http://schemas.openxmlformats.org/drawingml/2006/main" name="Office Theme">
   <a:themeElements>

</xml_diff>